<commit_message>
new vsd material for Module 1.2
</commit_message>
<xml_diff>
--- a/Slides/Module 01.2 Requirements Gathering.pptx
+++ b/Slides/Module 01.2 Requirements Gathering.pptx
@@ -21681,7 +21681,12 @@
             <p:ph idx="1"/>
           </p:nvPr>
         </p:nvSpPr>
-        <p:spPr/>
+        <p:spPr>
+          <a:xfrm>
+            <a:off x="838199" y="1500160"/>
+            <a:ext cx="10515599" cy="4351338"/>
+          </a:xfrm>
+        </p:spPr>
         <p:txBody>
           <a:bodyPr/>
           <a:lstStyle/>

</xml_diff>

<commit_message>
adding joydeep's name to 1st slide and resolving merge conflict
</commit_message>
<xml_diff>
--- a/Slides/Module 01.2 Requirements Gathering.pptx
+++ b/Slides/Module 01.2 Requirements Gathering.pptx
@@ -2321,8 +2321,8 @@
     <dgm:cxn modelId="{0D619939-DF3D-4D20-BB53-412AF78EA558}" type="presOf" srcId="{ABB0E679-4682-422A-B4B3-34D44CC4C90C}" destId="{BBEC7333-A5CB-4B43-A34A-870E516E4DD6}" srcOrd="0" destOrd="0" presId="urn:microsoft.com/office/officeart/2018/2/layout/IconVerticalSolidList"/>
     <dgm:cxn modelId="{07AC9C4A-377E-4379-B550-8DB49E3862F9}" srcId="{ABB0E679-4682-422A-B4B3-34D44CC4C90C}" destId="{8859CDF6-BBF5-4A76-8A76-407071531CB6}" srcOrd="2" destOrd="0" parTransId="{4553293F-765F-468C-A52D-17712ED16F1F}" sibTransId="{CD3D3010-EDC9-481C-A822-9AFA251D0BAD}"/>
     <dgm:cxn modelId="{F7C5F74B-BB11-4F28-9F7E-23FE778011DC}" type="presOf" srcId="{79B77230-D940-49CC-AF47-BF1D40797D89}" destId="{D527155E-0657-496B-926B-6BBC0B628D07}" srcOrd="0" destOrd="0" presId="urn:microsoft.com/office/officeart/2018/2/layout/IconVerticalSolidList"/>
+    <dgm:cxn modelId="{BBA2886E-1FC2-4FFE-BF42-BABB70DB9D54}" srcId="{ABB0E679-4682-422A-B4B3-34D44CC4C90C}" destId="{79B77230-D940-49CC-AF47-BF1D40797D89}" srcOrd="0" destOrd="0" parTransId="{C50558CC-69DA-4C28-8CB9-2982E9088524}" sibTransId="{01A261DD-4242-4987-8459-53BA826F65E4}"/>
     <dgm:cxn modelId="{16B49D51-0857-4A44-AD1A-0C1006418460}" srcId="{7851135E-E593-49EB-9C66-FB8F80DCC8EB}" destId="{0F25331F-8FB8-4E3A-87F2-3F285D74EB32}" srcOrd="2" destOrd="0" parTransId="{324E124D-8500-4C04-A0BA-6F6C2D553D81}" sibTransId="{4716CEE8-C882-4DFA-8AAE-CB3797F9F69F}"/>
-    <dgm:cxn modelId="{BBA2886E-1FC2-4FFE-BF42-BABB70DB9D54}" srcId="{ABB0E679-4682-422A-B4B3-34D44CC4C90C}" destId="{79B77230-D940-49CC-AF47-BF1D40797D89}" srcOrd="0" destOrd="0" parTransId="{C50558CC-69DA-4C28-8CB9-2982E9088524}" sibTransId="{01A261DD-4242-4987-8459-53BA826F65E4}"/>
     <dgm:cxn modelId="{6F534F79-49C3-49F2-B767-CA8451407698}" type="presOf" srcId="{2CC7D121-8A41-44D9-89BD-244AA28A42A0}" destId="{D527155E-0657-496B-926B-6BBC0B628D07}" srcOrd="0" destOrd="1" presId="urn:microsoft.com/office/officeart/2018/2/layout/IconVerticalSolidList"/>
     <dgm:cxn modelId="{83B9F09E-EAE2-4CC8-ADD5-C1D9758C0071}" type="presOf" srcId="{A898EC3E-4F02-462D-8397-BC48F29AE81B}" destId="{4FB2F518-2BF4-4FD7-A56E-47F3A3918E17}" srcOrd="0" destOrd="0" presId="urn:microsoft.com/office/officeart/2018/2/layout/IconVerticalSolidList"/>
     <dgm:cxn modelId="{D9C411B4-474A-4FB0-9E9B-1E92A378E566}" srcId="{289B9B18-ED8C-4F8C-B57D-E359AFC29DCD}" destId="{A898EC3E-4F02-462D-8397-BC48F29AE81B}" srcOrd="0" destOrd="0" parTransId="{AD9DCD49-7708-4181-B664-3E4D3C91E37D}" sibTransId="{5F251CD8-B93E-4310-9598-EB0F0D698564}"/>
@@ -6137,7 +6137,7 @@
           <a:p>
             <a:fld id="{7C7E5181-6CF5-45F7-A87A-E0E0B1FD7549}" type="datetimeFigureOut">
               <a:rPr lang="en-US" smtClean="0"/>
-              <a:t>6/5/25</a:t>
+              <a:t>6/5/2025</a:t>
             </a:fld>
             <a:endParaRPr lang="en-US"/>
           </a:p>
@@ -9447,7 +9447,7 @@
           <a:p>
             <a:fld id="{5D2A64DE-480B-420F-9649-4F8E696E08E0}" type="datetime1">
               <a:rPr lang="en-US" smtClean="0"/>
-              <a:t>6/5/25</a:t>
+              <a:t>6/5/2025</a:t>
             </a:fld>
             <a:endParaRPr lang="en-US"/>
           </a:p>
@@ -9771,7 +9771,7 @@
           <a:p>
             <a:fld id="{EA476A42-A091-4468-A075-64A31BE59948}" type="datetime1">
               <a:rPr lang="en-US" smtClean="0"/>
-              <a:t>6/5/25</a:t>
+              <a:t>6/5/2025</a:t>
             </a:fld>
             <a:endParaRPr lang="en-US"/>
           </a:p>
@@ -9969,7 +9969,7 @@
           <a:p>
             <a:fld id="{0D3616D0-8311-4107-9726-6B805E7D05BA}" type="datetime1">
               <a:rPr lang="en-US" smtClean="0"/>
-              <a:t>6/5/25</a:t>
+              <a:t>6/5/2025</a:t>
             </a:fld>
             <a:endParaRPr lang="en-US"/>
           </a:p>
@@ -10177,7 +10177,7 @@
           <a:p>
             <a:fld id="{3BC2557A-5C88-417A-A763-5AC779462A5F}" type="datetime1">
               <a:rPr lang="en-US" smtClean="0"/>
-              <a:t>6/5/25</a:t>
+              <a:t>6/5/2025</a:t>
             </a:fld>
             <a:endParaRPr lang="en-US"/>
           </a:p>
@@ -10701,7 +10701,7 @@
           <a:p>
             <a:fld id="{07C7BFD4-467E-4EDE-93EA-052F5B39A4E5}" type="datetime1">
               <a:rPr lang="en-US" smtClean="0"/>
-              <a:t>6/5/25</a:t>
+              <a:t>6/5/2025</a:t>
             </a:fld>
             <a:endParaRPr lang="en-US"/>
           </a:p>
@@ -10951,7 +10951,7 @@
           <a:p>
             <a:fld id="{07C7BFD4-467E-4EDE-93EA-052F5B39A4E5}" type="datetime1">
               <a:rPr lang="en-US" smtClean="0"/>
-              <a:t>6/5/25</a:t>
+              <a:t>6/5/2025</a:t>
             </a:fld>
             <a:endParaRPr lang="en-US"/>
           </a:p>
@@ -11133,7 +11133,7 @@
           <a:p>
             <a:fld id="{109E55A0-C911-4F03-82FC-7E5926047D46}" type="datetime1">
               <a:rPr lang="en-US" smtClean="0"/>
-              <a:t>6/5/25</a:t>
+              <a:t>6/5/2025</a:t>
             </a:fld>
             <a:endParaRPr lang="en-US"/>
           </a:p>
@@ -11446,7 +11446,7 @@
           <a:p>
             <a:fld id="{A533CBE2-D5BE-47AC-ADC2-9CDFC1D0CF90}" type="datetime1">
               <a:rPr lang="en-US" smtClean="0"/>
-              <a:t>6/5/25</a:t>
+              <a:t>6/5/2025</a:t>
             </a:fld>
             <a:endParaRPr lang="en-US"/>
           </a:p>
@@ -11747,7 +11747,7 @@
           <a:p>
             <a:fld id="{39B7EDB1-CE74-4951-85A2-0B01C2128E28}" type="datetime1">
               <a:rPr lang="en-US" smtClean="0"/>
-              <a:t>6/5/25</a:t>
+              <a:t>6/5/2025</a:t>
             </a:fld>
             <a:endParaRPr lang="en-US"/>
           </a:p>
@@ -12195,7 +12195,7 @@
           <a:p>
             <a:fld id="{2BC7EB92-A5C2-4807-A9DC-9EDE6CBFB241}" type="datetime1">
               <a:rPr lang="en-US" smtClean="0"/>
-              <a:t>6/5/25</a:t>
+              <a:t>6/5/2025</a:t>
             </a:fld>
             <a:endParaRPr lang="en-US"/>
           </a:p>
@@ -12308,7 +12308,7 @@
           <a:p>
             <a:fld id="{2B7B7EE0-7771-4CD5-9B2B-3550753A54A1}" type="datetime1">
               <a:rPr lang="en-US" smtClean="0"/>
-              <a:t>6/5/25</a:t>
+              <a:t>6/5/2025</a:t>
             </a:fld>
             <a:endParaRPr lang="en-US"/>
           </a:p>
@@ -12619,7 +12619,7 @@
           <a:p>
             <a:fld id="{F8B318B3-0E87-4416-A9B8-D891968C2727}" type="datetime1">
               <a:rPr lang="en-US" smtClean="0"/>
-              <a:t>6/5/25</a:t>
+              <a:t>6/5/2025</a:t>
             </a:fld>
             <a:endParaRPr lang="en-US"/>
           </a:p>
@@ -12860,7 +12860,7 @@
           <a:p>
             <a:fld id="{54D997E8-DDEE-43F1-8D9B-F8A1E11DE488}" type="datetime1">
               <a:rPr lang="en-US" smtClean="0"/>
-              <a:t>6/5/25</a:t>
+              <a:t>6/5/2025</a:t>
             </a:fld>
             <a:endParaRPr lang="en-US"/>
           </a:p>
@@ -13359,7 +13359,15 @@
             </a:pPr>
             <a:r>
               <a:rPr lang="en-US" sz="2400" dirty="0"/>
-              <a:t>Adeel Bhutta and Mitch Wand</a:t>
+              <a:t>Adeel Bhutta</a:t>
+            </a:r>
+            <a:r>
+              <a:rPr lang="en-US" sz="2400"/>
+              <a:t>, Joydeep Mitra </a:t>
+            </a:r>
+            <a:r>
+              <a:rPr lang="en-US" sz="2400" dirty="0"/>
+              <a:t>and Mitch Wand</a:t>
             </a:r>
           </a:p>
           <a:p>

</xml_diff>

<commit_message>
added speaker notes and minor edits
</commit_message>
<xml_diff>
--- a/Slides/Module 01.2 Requirements Gathering.pptx
+++ b/Slides/Module 01.2 Requirements Gathering.pptx
@@ -5,7 +5,7 @@
     <p:sldMasterId id="2147483648" r:id="rId1"/>
   </p:sldMasterIdLst>
   <p:notesMasterIdLst>
-    <p:notesMasterId r:id="rId45"/>
+    <p:notesMasterId r:id="rId44"/>
   </p:notesMasterIdLst>
   <p:sldIdLst>
     <p:sldId id="485" r:id="rId2"/>
@@ -39,32 +39,31 @@
     <p:sldId id="494" r:id="rId30"/>
     <p:sldId id="496" r:id="rId31"/>
     <p:sldId id="495" r:id="rId32"/>
-    <p:sldId id="498" r:id="rId33"/>
-    <p:sldId id="552" r:id="rId34"/>
-    <p:sldId id="553" r:id="rId35"/>
-    <p:sldId id="554" r:id="rId36"/>
-    <p:sldId id="555" r:id="rId37"/>
-    <p:sldId id="556" r:id="rId38"/>
-    <p:sldId id="557" r:id="rId39"/>
-    <p:sldId id="558" r:id="rId40"/>
-    <p:sldId id="559" r:id="rId41"/>
-    <p:sldId id="560" r:id="rId42"/>
-    <p:sldId id="561" r:id="rId43"/>
-    <p:sldId id="562" r:id="rId44"/>
+    <p:sldId id="552" r:id="rId33"/>
+    <p:sldId id="553" r:id="rId34"/>
+    <p:sldId id="555" r:id="rId35"/>
+    <p:sldId id="556" r:id="rId36"/>
+    <p:sldId id="557" r:id="rId37"/>
+    <p:sldId id="558" r:id="rId38"/>
+    <p:sldId id="559" r:id="rId39"/>
+    <p:sldId id="560" r:id="rId40"/>
+    <p:sldId id="561" r:id="rId41"/>
+    <p:sldId id="562" r:id="rId42"/>
+    <p:sldId id="498" r:id="rId43"/>
   </p:sldIdLst>
   <p:sldSz cx="12192000" cy="6858000"/>
   <p:notesSz cx="9144000" cy="6858000"/>
   <p:embeddedFontLst>
     <p:embeddedFont>
       <p:font typeface="Ink Free" panose="03080402000500000000" pitchFamily="66" charset="0"/>
-      <p:regular r:id="rId46"/>
+      <p:regular r:id="rId45"/>
     </p:embeddedFont>
     <p:embeddedFont>
       <p:font typeface="Verdana" panose="020B0604030504040204" pitchFamily="34" charset="0"/>
-      <p:regular r:id="rId47"/>
-      <p:bold r:id="rId48"/>
-      <p:italic r:id="rId49"/>
-      <p:boldItalic r:id="rId50"/>
+      <p:regular r:id="rId46"/>
+      <p:bold r:id="rId47"/>
+      <p:italic r:id="rId48"/>
+      <p:boldItalic r:id="rId49"/>
     </p:embeddedFont>
   </p:embeddedFontLst>
   <p:defaultTextStyle>
@@ -198,10 +197,8 @@
             <p14:sldId id="494"/>
             <p14:sldId id="496"/>
             <p14:sldId id="495"/>
-            <p14:sldId id="498"/>
             <p14:sldId id="552"/>
             <p14:sldId id="553"/>
-            <p14:sldId id="554"/>
             <p14:sldId id="555"/>
             <p14:sldId id="556"/>
             <p14:sldId id="557"/>
@@ -210,6 +207,7 @@
             <p14:sldId id="560"/>
             <p14:sldId id="561"/>
             <p14:sldId id="562"/>
+            <p14:sldId id="498"/>
           </p14:sldIdLst>
         </p14:section>
       </p14:sectionLst>
@@ -2321,8 +2319,8 @@
     <dgm:cxn modelId="{0D619939-DF3D-4D20-BB53-412AF78EA558}" type="presOf" srcId="{ABB0E679-4682-422A-B4B3-34D44CC4C90C}" destId="{BBEC7333-A5CB-4B43-A34A-870E516E4DD6}" srcOrd="0" destOrd="0" presId="urn:microsoft.com/office/officeart/2018/2/layout/IconVerticalSolidList"/>
     <dgm:cxn modelId="{07AC9C4A-377E-4379-B550-8DB49E3862F9}" srcId="{ABB0E679-4682-422A-B4B3-34D44CC4C90C}" destId="{8859CDF6-BBF5-4A76-8A76-407071531CB6}" srcOrd="2" destOrd="0" parTransId="{4553293F-765F-468C-A52D-17712ED16F1F}" sibTransId="{CD3D3010-EDC9-481C-A822-9AFA251D0BAD}"/>
     <dgm:cxn modelId="{F7C5F74B-BB11-4F28-9F7E-23FE778011DC}" type="presOf" srcId="{79B77230-D940-49CC-AF47-BF1D40797D89}" destId="{D527155E-0657-496B-926B-6BBC0B628D07}" srcOrd="0" destOrd="0" presId="urn:microsoft.com/office/officeart/2018/2/layout/IconVerticalSolidList"/>
+    <dgm:cxn modelId="{16B49D51-0857-4A44-AD1A-0C1006418460}" srcId="{7851135E-E593-49EB-9C66-FB8F80DCC8EB}" destId="{0F25331F-8FB8-4E3A-87F2-3F285D74EB32}" srcOrd="2" destOrd="0" parTransId="{324E124D-8500-4C04-A0BA-6F6C2D553D81}" sibTransId="{4716CEE8-C882-4DFA-8AAE-CB3797F9F69F}"/>
     <dgm:cxn modelId="{BBA2886E-1FC2-4FFE-BF42-BABB70DB9D54}" srcId="{ABB0E679-4682-422A-B4B3-34D44CC4C90C}" destId="{79B77230-D940-49CC-AF47-BF1D40797D89}" srcOrd="0" destOrd="0" parTransId="{C50558CC-69DA-4C28-8CB9-2982E9088524}" sibTransId="{01A261DD-4242-4987-8459-53BA826F65E4}"/>
-    <dgm:cxn modelId="{16B49D51-0857-4A44-AD1A-0C1006418460}" srcId="{7851135E-E593-49EB-9C66-FB8F80DCC8EB}" destId="{0F25331F-8FB8-4E3A-87F2-3F285D74EB32}" srcOrd="2" destOrd="0" parTransId="{324E124D-8500-4C04-A0BA-6F6C2D553D81}" sibTransId="{4716CEE8-C882-4DFA-8AAE-CB3797F9F69F}"/>
     <dgm:cxn modelId="{6F534F79-49C3-49F2-B767-CA8451407698}" type="presOf" srcId="{2CC7D121-8A41-44D9-89BD-244AA28A42A0}" destId="{D527155E-0657-496B-926B-6BBC0B628D07}" srcOrd="0" destOrd="1" presId="urn:microsoft.com/office/officeart/2018/2/layout/IconVerticalSolidList"/>
     <dgm:cxn modelId="{83B9F09E-EAE2-4CC8-ADD5-C1D9758C0071}" type="presOf" srcId="{A898EC3E-4F02-462D-8397-BC48F29AE81B}" destId="{4FB2F518-2BF4-4FD7-A56E-47F3A3918E17}" srcOrd="0" destOrd="0" presId="urn:microsoft.com/office/officeart/2018/2/layout/IconVerticalSolidList"/>
     <dgm:cxn modelId="{D9C411B4-474A-4FB0-9E9B-1E92A378E566}" srcId="{289B9B18-ED8C-4F8C-B57D-E359AFC29DCD}" destId="{A898EC3E-4F02-462D-8397-BC48F29AE81B}" srcOrd="0" destOrd="0" parTransId="{AD9DCD49-7708-4181-B664-3E4D3C91E37D}" sibTransId="{5F251CD8-B93E-4310-9598-EB0F0D698564}"/>
@@ -6137,7 +6135,7 @@
           <a:p>
             <a:fld id="{7C7E5181-6CF5-45F7-A87A-E0E0B1FD7549}" type="datetimeFigureOut">
               <a:rPr lang="en-US" smtClean="0"/>
-              <a:t>6/5/2025</a:t>
+              <a:t>6/25/25</a:t>
             </a:fld>
             <a:endParaRPr lang="en-US"/>
           </a:p>
@@ -8330,7 +8328,28 @@
           <a:bodyPr/>
           <a:lstStyle/>
           <a:p>
+            <a:r>
+              <a:rPr lang="en-US" dirty="0"/>
+              <a:t>It is essential to consider ethics and values when building technology. </a:t>
+            </a:r>
+          </a:p>
+          <a:p>
             <a:endParaRPr lang="en-US" dirty="0"/>
+          </a:p>
+          <a:p>
+            <a:r>
+              <a:rPr lang="en-US" dirty="0"/>
+              <a:t>Identifying and grappling with value tensions during the requirements and design phase leads to “better” apps, websites, software systems, artificial intelligence, etc. </a:t>
+            </a:r>
+          </a:p>
+          <a:p>
+            <a:endParaRPr lang="en-US" dirty="0"/>
+          </a:p>
+          <a:p>
+            <a:r>
+              <a:rPr lang="en-US" dirty="0"/>
+              <a:t>In the next few slides we will focus on the process of applying ethics to the software engineering process.</a:t>
+            </a:r>
           </a:p>
         </p:txBody>
       </p:sp>
@@ -8360,7 +8379,664 @@
     </p:spTree>
     <p:extLst>
       <p:ext uri="{BB962C8B-B14F-4D97-AF65-F5344CB8AC3E}">
-        <p14:creationId xmlns:p14="http://schemas.microsoft.com/office/powerpoint/2010/main" val="1604120877"/>
+        <p14:creationId xmlns:p14="http://schemas.microsoft.com/office/powerpoint/2010/main" val="1126080033"/>
+      </p:ext>
+    </p:extLst>
+  </p:cSld>
+  <p:clrMapOvr>
+    <a:masterClrMapping/>
+  </p:clrMapOvr>
+</p:notes>
+</file>
+
+<file path=ppt/notesSlides/notesSlide25.xml><?xml version="1.0" encoding="utf-8"?>
+<p:notes xmlns:a="http://schemas.openxmlformats.org/drawingml/2006/main" xmlns:r="http://schemas.openxmlformats.org/officeDocument/2006/relationships" xmlns:p="http://schemas.openxmlformats.org/presentationml/2006/main">
+  <p:cSld>
+    <p:spTree>
+      <p:nvGrpSpPr>
+        <p:cNvPr id="1" name=""/>
+        <p:cNvGrpSpPr/>
+        <p:nvPr/>
+      </p:nvGrpSpPr>
+      <p:grpSpPr>
+        <a:xfrm>
+          <a:off x="0" y="0"/>
+          <a:ext cx="0" cy="0"/>
+          <a:chOff x="0" y="0"/>
+          <a:chExt cx="0" cy="0"/>
+        </a:xfrm>
+      </p:grpSpPr>
+      <p:sp>
+        <p:nvSpPr>
+          <p:cNvPr id="2" name="Slide Image Placeholder 1"/>
+          <p:cNvSpPr>
+            <a:spLocks noGrp="1" noRot="1" noChangeAspect="1"/>
+          </p:cNvSpPr>
+          <p:nvPr>
+            <p:ph type="sldImg"/>
+          </p:nvPr>
+        </p:nvSpPr>
+        <p:spPr/>
+      </p:sp>
+      <p:sp>
+        <p:nvSpPr>
+          <p:cNvPr id="3" name="Notes Placeholder 2"/>
+          <p:cNvSpPr>
+            <a:spLocks noGrp="1"/>
+          </p:cNvSpPr>
+          <p:nvPr>
+            <p:ph type="body" idx="1"/>
+          </p:nvPr>
+        </p:nvSpPr>
+        <p:spPr/>
+        <p:txBody>
+          <a:bodyPr/>
+          <a:lstStyle/>
+          <a:p>
+            <a:r>
+              <a:rPr lang="en-US" dirty="0"/>
+              <a:t>Cookies and security solutions such as HTTPS are an outcome of an analysis that considers ethical aspects and values such as informed consent</a:t>
+            </a:r>
+          </a:p>
+          <a:p>
+            <a:endParaRPr lang="en-US" dirty="0"/>
+          </a:p>
+          <a:p>
+            <a:r>
+              <a:rPr lang="en-US" dirty="0"/>
+              <a:t>Ask students What is Informed consent and how can it be designed in an online environment? </a:t>
+            </a:r>
+          </a:p>
+          <a:p>
+            <a:endParaRPr lang="en-US" dirty="0"/>
+          </a:p>
+          <a:p>
+            <a:r>
+              <a:rPr lang="en-US" dirty="0"/>
+              <a:t>The design hinges on the following constructs:</a:t>
+            </a:r>
+          </a:p>
+          <a:p>
+            <a:pPr marL="171450" indent="-171450">
+              <a:buFontTx/>
+              <a:buChar char="-"/>
+            </a:pPr>
+            <a:r>
+              <a:rPr lang="en-US" dirty="0"/>
+              <a:t>Disclosure refers to providing accurate information on the pros and cons of the action</a:t>
+            </a:r>
+          </a:p>
+          <a:p>
+            <a:pPr marL="171450" indent="-171450">
+              <a:buFontTx/>
+              <a:buChar char="-"/>
+            </a:pPr>
+            <a:r>
+              <a:rPr lang="en-US" dirty="0"/>
+              <a:t>comprehension refers to a user’s accurate interpretation of what is being disclosed</a:t>
+            </a:r>
+          </a:p>
+          <a:p>
+            <a:pPr marL="171450" indent="-171450">
+              <a:buFontTx/>
+              <a:buChar char="-"/>
+            </a:pPr>
+            <a:r>
+              <a:rPr lang="en-US" dirty="0"/>
+              <a:t>Voluntariness refers to ensuring no coercion or control</a:t>
+            </a:r>
+          </a:p>
+          <a:p>
+            <a:pPr marL="171450" indent="-171450">
+              <a:buFontTx/>
+              <a:buChar char="-"/>
+            </a:pPr>
+            <a:r>
+              <a:rPr lang="en-US" dirty="0"/>
+              <a:t>competence refers to an individual’s mental and physical capability to give consent</a:t>
+            </a:r>
+          </a:p>
+          <a:p>
+            <a:pPr marL="171450" indent="-171450">
+              <a:buFontTx/>
+              <a:buChar char="-"/>
+            </a:pPr>
+            <a:r>
+              <a:rPr lang="en-US" dirty="0"/>
+              <a:t>Agreement refers to a clear opportunity to accept or decline</a:t>
+            </a:r>
+          </a:p>
+        </p:txBody>
+      </p:sp>
+      <p:sp>
+        <p:nvSpPr>
+          <p:cNvPr id="4" name="Slide Number Placeholder 3"/>
+          <p:cNvSpPr>
+            <a:spLocks noGrp="1"/>
+          </p:cNvSpPr>
+          <p:nvPr>
+            <p:ph type="sldNum" sz="quarter" idx="5"/>
+          </p:nvPr>
+        </p:nvSpPr>
+        <p:spPr/>
+        <p:txBody>
+          <a:bodyPr/>
+          <a:lstStyle/>
+          <a:p>
+            <a:fld id="{07937F07-1250-4CCE-B198-1B2887014F41}" type="slidenum">
+              <a:rPr lang="en-US" smtClean="0"/>
+              <a:t>33</a:t>
+            </a:fld>
+            <a:endParaRPr lang="en-US"/>
+          </a:p>
+        </p:txBody>
+      </p:sp>
+    </p:spTree>
+    <p:extLst>
+      <p:ext uri="{BB962C8B-B14F-4D97-AF65-F5344CB8AC3E}">
+        <p14:creationId xmlns:p14="http://schemas.microsoft.com/office/powerpoint/2010/main" val="507575943"/>
+      </p:ext>
+    </p:extLst>
+  </p:cSld>
+  <p:clrMapOvr>
+    <a:masterClrMapping/>
+  </p:clrMapOvr>
+</p:notes>
+</file>
+
+<file path=ppt/notesSlides/notesSlide26.xml><?xml version="1.0" encoding="utf-8"?>
+<p:notes xmlns:a="http://schemas.openxmlformats.org/drawingml/2006/main" xmlns:r="http://schemas.openxmlformats.org/officeDocument/2006/relationships" xmlns:p="http://schemas.openxmlformats.org/presentationml/2006/main">
+  <p:cSld>
+    <p:spTree>
+      <p:nvGrpSpPr>
+        <p:cNvPr id="1" name=""/>
+        <p:cNvGrpSpPr/>
+        <p:nvPr/>
+      </p:nvGrpSpPr>
+      <p:grpSpPr>
+        <a:xfrm>
+          <a:off x="0" y="0"/>
+          <a:ext cx="0" cy="0"/>
+          <a:chOff x="0" y="0"/>
+          <a:chExt cx="0" cy="0"/>
+        </a:xfrm>
+      </p:grpSpPr>
+      <p:sp>
+        <p:nvSpPr>
+          <p:cNvPr id="2" name="Slide Image Placeholder 1"/>
+          <p:cNvSpPr>
+            <a:spLocks noGrp="1" noRot="1" noChangeAspect="1"/>
+          </p:cNvSpPr>
+          <p:nvPr>
+            <p:ph type="sldImg"/>
+          </p:nvPr>
+        </p:nvSpPr>
+        <p:spPr/>
+      </p:sp>
+      <p:sp>
+        <p:nvSpPr>
+          <p:cNvPr id="3" name="Notes Placeholder 2"/>
+          <p:cNvSpPr>
+            <a:spLocks noGrp="1"/>
+          </p:cNvSpPr>
+          <p:nvPr>
+            <p:ph type="body" idx="1"/>
+          </p:nvPr>
+        </p:nvSpPr>
+        <p:spPr/>
+        <p:txBody>
+          <a:bodyPr/>
+          <a:lstStyle/>
+          <a:p>
+            <a:r>
+              <a:rPr lang="en-US" dirty="0"/>
+              <a:t>The case study aligns with the final project</a:t>
+            </a:r>
+          </a:p>
+        </p:txBody>
+      </p:sp>
+      <p:sp>
+        <p:nvSpPr>
+          <p:cNvPr id="4" name="Slide Number Placeholder 3"/>
+          <p:cNvSpPr>
+            <a:spLocks noGrp="1"/>
+          </p:cNvSpPr>
+          <p:nvPr>
+            <p:ph type="sldNum" sz="quarter" idx="5"/>
+          </p:nvPr>
+        </p:nvSpPr>
+        <p:spPr/>
+        <p:txBody>
+          <a:bodyPr/>
+          <a:lstStyle/>
+          <a:p>
+            <a:fld id="{07937F07-1250-4CCE-B198-1B2887014F41}" type="slidenum">
+              <a:rPr lang="en-US" smtClean="0"/>
+              <a:t>36</a:t>
+            </a:fld>
+            <a:endParaRPr lang="en-US"/>
+          </a:p>
+        </p:txBody>
+      </p:sp>
+    </p:spTree>
+    <p:extLst>
+      <p:ext uri="{BB962C8B-B14F-4D97-AF65-F5344CB8AC3E}">
+        <p14:creationId xmlns:p14="http://schemas.microsoft.com/office/powerpoint/2010/main" val="963801901"/>
+      </p:ext>
+    </p:extLst>
+  </p:cSld>
+  <p:clrMapOvr>
+    <a:masterClrMapping/>
+  </p:clrMapOvr>
+</p:notes>
+</file>
+
+<file path=ppt/notesSlides/notesSlide27.xml><?xml version="1.0" encoding="utf-8"?>
+<p:notes xmlns:a="http://schemas.openxmlformats.org/drawingml/2006/main" xmlns:r="http://schemas.openxmlformats.org/officeDocument/2006/relationships" xmlns:p="http://schemas.openxmlformats.org/presentationml/2006/main">
+  <p:cSld>
+    <p:spTree>
+      <p:nvGrpSpPr>
+        <p:cNvPr id="1" name=""/>
+        <p:cNvGrpSpPr/>
+        <p:nvPr/>
+      </p:nvGrpSpPr>
+      <p:grpSpPr>
+        <a:xfrm>
+          <a:off x="0" y="0"/>
+          <a:ext cx="0" cy="0"/>
+          <a:chOff x="0" y="0"/>
+          <a:chExt cx="0" cy="0"/>
+        </a:xfrm>
+      </p:grpSpPr>
+      <p:sp>
+        <p:nvSpPr>
+          <p:cNvPr id="2" name="Slide Image Placeholder 1"/>
+          <p:cNvSpPr>
+            <a:spLocks noGrp="1" noRot="1" noChangeAspect="1"/>
+          </p:cNvSpPr>
+          <p:nvPr>
+            <p:ph type="sldImg"/>
+          </p:nvPr>
+        </p:nvSpPr>
+        <p:spPr/>
+      </p:sp>
+      <p:sp>
+        <p:nvSpPr>
+          <p:cNvPr id="3" name="Notes Placeholder 2"/>
+          <p:cNvSpPr>
+            <a:spLocks noGrp="1"/>
+          </p:cNvSpPr>
+          <p:nvPr>
+            <p:ph type="body" idx="1"/>
+          </p:nvPr>
+        </p:nvSpPr>
+        <p:spPr/>
+        <p:txBody>
+          <a:bodyPr/>
+          <a:lstStyle/>
+          <a:p>
+            <a:r>
+              <a:rPr lang="en-US" dirty="0"/>
+              <a:t>Students must first discuss these questions in groups. Below is a sample answer not necessarily the only answer.</a:t>
+            </a:r>
+          </a:p>
+          <a:p>
+            <a:endParaRPr lang="en-US" dirty="0"/>
+          </a:p>
+          <a:p>
+            <a:r>
+              <a:rPr lang="en-US" dirty="0"/>
+              <a:t>Dataset may not be representative as it may not capture all nuances of language (even in English) used in different communities such as slangs, dialects, or culturally specific phrases.</a:t>
+            </a:r>
+          </a:p>
+          <a:p>
+            <a:endParaRPr lang="en-US" dirty="0"/>
+          </a:p>
+          <a:p>
+            <a:r>
+              <a:rPr lang="en-US" dirty="0"/>
+              <a:t>Dataset maybe biased as it may be based on historical posts that were flagged by human moderators. E.g., posts from specific communities were flagged more.</a:t>
+            </a:r>
+          </a:p>
+          <a:p>
+            <a:endParaRPr lang="en-US" dirty="0"/>
+          </a:p>
+          <a:p>
+            <a:r>
+              <a:rPr lang="en-US" dirty="0"/>
+              <a:t>Complications: what constitutes hate speech isn’t clear. For e.g., some words may have been reclaimed by specific communities or posts may use satire to make a point.</a:t>
+            </a:r>
+          </a:p>
+        </p:txBody>
+      </p:sp>
+      <p:sp>
+        <p:nvSpPr>
+          <p:cNvPr id="4" name="Slide Number Placeholder 3"/>
+          <p:cNvSpPr>
+            <a:spLocks noGrp="1"/>
+          </p:cNvSpPr>
+          <p:nvPr>
+            <p:ph type="sldNum" sz="quarter" idx="5"/>
+          </p:nvPr>
+        </p:nvSpPr>
+        <p:spPr/>
+        <p:txBody>
+          <a:bodyPr/>
+          <a:lstStyle/>
+          <a:p>
+            <a:fld id="{07937F07-1250-4CCE-B198-1B2887014F41}" type="slidenum">
+              <a:rPr lang="en-US" smtClean="0"/>
+              <a:t>37</a:t>
+            </a:fld>
+            <a:endParaRPr lang="en-US"/>
+          </a:p>
+        </p:txBody>
+      </p:sp>
+    </p:spTree>
+    <p:extLst>
+      <p:ext uri="{BB962C8B-B14F-4D97-AF65-F5344CB8AC3E}">
+        <p14:creationId xmlns:p14="http://schemas.microsoft.com/office/powerpoint/2010/main" val="2862960920"/>
+      </p:ext>
+    </p:extLst>
+  </p:cSld>
+  <p:clrMapOvr>
+    <a:masterClrMapping/>
+  </p:clrMapOvr>
+</p:notes>
+</file>
+
+<file path=ppt/notesSlides/notesSlide28.xml><?xml version="1.0" encoding="utf-8"?>
+<p:notes xmlns:a="http://schemas.openxmlformats.org/drawingml/2006/main" xmlns:r="http://schemas.openxmlformats.org/officeDocument/2006/relationships" xmlns:p="http://schemas.openxmlformats.org/presentationml/2006/main">
+  <p:cSld>
+    <p:spTree>
+      <p:nvGrpSpPr>
+        <p:cNvPr id="1" name=""/>
+        <p:cNvGrpSpPr/>
+        <p:nvPr/>
+      </p:nvGrpSpPr>
+      <p:grpSpPr>
+        <a:xfrm>
+          <a:off x="0" y="0"/>
+          <a:ext cx="0" cy="0"/>
+          <a:chOff x="0" y="0"/>
+          <a:chExt cx="0" cy="0"/>
+        </a:xfrm>
+      </p:grpSpPr>
+      <p:sp>
+        <p:nvSpPr>
+          <p:cNvPr id="2" name="Slide Image Placeholder 1"/>
+          <p:cNvSpPr>
+            <a:spLocks noGrp="1" noRot="1" noChangeAspect="1"/>
+          </p:cNvSpPr>
+          <p:nvPr>
+            <p:ph type="sldImg"/>
+          </p:nvPr>
+        </p:nvSpPr>
+        <p:spPr/>
+      </p:sp>
+      <p:sp>
+        <p:nvSpPr>
+          <p:cNvPr id="3" name="Notes Placeholder 2"/>
+          <p:cNvSpPr>
+            <a:spLocks noGrp="1"/>
+          </p:cNvSpPr>
+          <p:nvPr>
+            <p:ph type="body" idx="1"/>
+          </p:nvPr>
+        </p:nvSpPr>
+        <p:spPr/>
+        <p:txBody>
+          <a:bodyPr/>
+          <a:lstStyle/>
+          <a:p>
+            <a:r>
+              <a:rPr lang="en-US" dirty="0"/>
+              <a:t>Students should reflect about these questions in groups.</a:t>
+            </a:r>
+          </a:p>
+          <a:p>
+            <a:endParaRPr lang="en-US" dirty="0"/>
+          </a:p>
+          <a:p>
+            <a:r>
+              <a:rPr lang="en-US" dirty="0"/>
+              <a:t>Here is a sample answer.</a:t>
+            </a:r>
+          </a:p>
+          <a:p>
+            <a:endParaRPr lang="en-US" dirty="0"/>
+          </a:p>
+          <a:p>
+            <a:r>
+              <a:rPr lang="en-US" dirty="0"/>
+              <a:t>1. Reddit users, moderators, reddit company, advertisers</a:t>
+            </a:r>
+          </a:p>
+          <a:p>
+            <a:r>
+              <a:rPr lang="en-US" dirty="0"/>
+              <a:t>2. Interests/Values</a:t>
+            </a:r>
+          </a:p>
+          <a:p>
+            <a:r>
+              <a:rPr lang="en-US" dirty="0"/>
+              <a:t>  Users: free expression, accurate information, entertainment, anonymity, privacy</a:t>
+            </a:r>
+          </a:p>
+          <a:p>
+            <a:r>
+              <a:rPr lang="en-US" dirty="0"/>
+              <a:t>  Moderators: consistent enforcement of rules, reduced workload, ability to correct mistakes, maintain subreddit culture, transparency</a:t>
+            </a:r>
+          </a:p>
+          <a:p>
+            <a:r>
+              <a:rPr lang="en-US" dirty="0"/>
+              <a:t>  company: user engagement, revenue, accountability,  building brand image, legal compliance</a:t>
+            </a:r>
+          </a:p>
+          <a:p>
+            <a:r>
+              <a:rPr lang="en-US" dirty="0"/>
+              <a:t>  advertisers: user reach, low cost, profit, seamless integration with content</a:t>
+            </a:r>
+          </a:p>
+          <a:p>
+            <a:r>
+              <a:rPr lang="en-US" dirty="0"/>
+              <a:t>3. Conflicts</a:t>
+            </a:r>
+            <a:br>
+              <a:rPr lang="en-US" dirty="0"/>
+            </a:br>
+            <a:r>
+              <a:rPr lang="en-US" dirty="0"/>
+              <a:t>    free expression vs. content moderation or legal compliance, accurate info vs. entertainment, user autonomy vs. advertiser revenue, anonymity vs. transparence</a:t>
+            </a:r>
+          </a:p>
+          <a:p>
+            <a:r>
+              <a:rPr lang="en-US" dirty="0"/>
+              <a:t>4. Prioritization depends on personal goals and values. They key thing to realize is that this process does not recommend values, it provides a framework to reason about them based on the identified tensions.</a:t>
+            </a:r>
+            <a:br>
+              <a:rPr lang="en-US" dirty="0"/>
+            </a:br>
+            <a:r>
+              <a:rPr lang="en-US" dirty="0"/>
+              <a:t>    </a:t>
+            </a:r>
+          </a:p>
+          <a:p>
+            <a:r>
+              <a:rPr lang="en-US" dirty="0"/>
+              <a:t>	</a:t>
+            </a:r>
+          </a:p>
+        </p:txBody>
+      </p:sp>
+      <p:sp>
+        <p:nvSpPr>
+          <p:cNvPr id="4" name="Slide Number Placeholder 3"/>
+          <p:cNvSpPr>
+            <a:spLocks noGrp="1"/>
+          </p:cNvSpPr>
+          <p:nvPr>
+            <p:ph type="sldNum" sz="quarter" idx="5"/>
+          </p:nvPr>
+        </p:nvSpPr>
+        <p:spPr/>
+        <p:txBody>
+          <a:bodyPr/>
+          <a:lstStyle/>
+          <a:p>
+            <a:fld id="{07937F07-1250-4CCE-B198-1B2887014F41}" type="slidenum">
+              <a:rPr lang="en-US" smtClean="0"/>
+              <a:t>38</a:t>
+            </a:fld>
+            <a:endParaRPr lang="en-US"/>
+          </a:p>
+        </p:txBody>
+      </p:sp>
+    </p:spTree>
+    <p:extLst>
+      <p:ext uri="{BB962C8B-B14F-4D97-AF65-F5344CB8AC3E}">
+        <p14:creationId xmlns:p14="http://schemas.microsoft.com/office/powerpoint/2010/main" val="3585566828"/>
+      </p:ext>
+    </p:extLst>
+  </p:cSld>
+  <p:clrMapOvr>
+    <a:masterClrMapping/>
+  </p:clrMapOvr>
+</p:notes>
+</file>
+
+<file path=ppt/notesSlides/notesSlide29.xml><?xml version="1.0" encoding="utf-8"?>
+<p:notes xmlns:a="http://schemas.openxmlformats.org/drawingml/2006/main" xmlns:r="http://schemas.openxmlformats.org/officeDocument/2006/relationships" xmlns:p="http://schemas.openxmlformats.org/presentationml/2006/main">
+  <p:cSld>
+    <p:spTree>
+      <p:nvGrpSpPr>
+        <p:cNvPr id="1" name=""/>
+        <p:cNvGrpSpPr/>
+        <p:nvPr/>
+      </p:nvGrpSpPr>
+      <p:grpSpPr>
+        <a:xfrm>
+          <a:off x="0" y="0"/>
+          <a:ext cx="0" cy="0"/>
+          <a:chOff x="0" y="0"/>
+          <a:chExt cx="0" cy="0"/>
+        </a:xfrm>
+      </p:grpSpPr>
+      <p:sp>
+        <p:nvSpPr>
+          <p:cNvPr id="2" name="Slide Image Placeholder 1"/>
+          <p:cNvSpPr>
+            <a:spLocks noGrp="1" noRot="1" noChangeAspect="1"/>
+          </p:cNvSpPr>
+          <p:nvPr>
+            <p:ph type="sldImg"/>
+          </p:nvPr>
+        </p:nvSpPr>
+        <p:spPr/>
+      </p:sp>
+      <p:sp>
+        <p:nvSpPr>
+          <p:cNvPr id="3" name="Notes Placeholder 2"/>
+          <p:cNvSpPr>
+            <a:spLocks noGrp="1"/>
+          </p:cNvSpPr>
+          <p:nvPr>
+            <p:ph type="body" idx="1"/>
+          </p:nvPr>
+        </p:nvSpPr>
+        <p:spPr/>
+        <p:txBody>
+          <a:bodyPr/>
+          <a:lstStyle/>
+          <a:p>
+            <a:r>
+              <a:rPr lang="en-US" dirty="0"/>
+              <a:t>Students should discuss these questions in groups but here is a sample answer. The primary purpose is to realize the tensions when designing features. </a:t>
+            </a:r>
+          </a:p>
+          <a:p>
+            <a:endParaRPr lang="en-US" dirty="0"/>
+          </a:p>
+          <a:p>
+            <a:pPr marL="228600" indent="-228600">
+              <a:buAutoNum type="arabicPeriod"/>
+            </a:pPr>
+            <a:r>
+              <a:rPr lang="en-US" dirty="0"/>
+              <a:t>Reddit removing user’s post might impinge on users’ right to freely express themselves. On the other hand, removing posts with known misinformation might encourage free speech by protecting the channels through which discussions happen. If posts with known hate speech is removed, then it protects the victims from being sidelined from the discourse.</a:t>
+            </a:r>
+          </a:p>
+          <a:p>
+            <a:pPr marL="228600" indent="-228600">
+              <a:buAutoNum type="arabicPeriod"/>
+            </a:pPr>
+            <a:r>
+              <a:rPr lang="en-US" dirty="0"/>
+              <a:t>Impinges on users’ right to freely express and also prevents other users from being exposed to different </a:t>
+            </a:r>
+            <a:r>
+              <a:rPr lang="en-US" dirty="0" err="1"/>
+              <a:t>prespectives</a:t>
+            </a:r>
+            <a:r>
+              <a:rPr lang="en-US" dirty="0"/>
+              <a:t>.</a:t>
+            </a:r>
+          </a:p>
+          <a:p>
+            <a:pPr marL="228600" indent="-228600">
+              <a:buAutoNum type="arabicPeriod"/>
+            </a:pPr>
+            <a:r>
+              <a:rPr lang="en-US" dirty="0"/>
+              <a:t>Excludes views of certain groups from the discourse.</a:t>
+            </a:r>
+          </a:p>
+          <a:p>
+            <a:pPr marL="228600" indent="-228600">
+              <a:buAutoNum type="arabicPeriod"/>
+            </a:pPr>
+            <a:r>
+              <a:rPr lang="en-US" dirty="0"/>
+              <a:t>The proposed requirement will foster free speech as free speech in not just about an individual’s right to free expression but it is also about protecting the channels through which everyone’s voices can be heard. It is also about creating an environment where individuals will learn and grow their thinking from the discussions. Hence, the moderation is only good if it is transparent and minimizes bias.</a:t>
+            </a:r>
+          </a:p>
+        </p:txBody>
+      </p:sp>
+      <p:sp>
+        <p:nvSpPr>
+          <p:cNvPr id="4" name="Slide Number Placeholder 3"/>
+          <p:cNvSpPr>
+            <a:spLocks noGrp="1"/>
+          </p:cNvSpPr>
+          <p:nvPr>
+            <p:ph type="sldNum" sz="quarter" idx="5"/>
+          </p:nvPr>
+        </p:nvSpPr>
+        <p:spPr/>
+        <p:txBody>
+          <a:bodyPr/>
+          <a:lstStyle/>
+          <a:p>
+            <a:fld id="{07937F07-1250-4CCE-B198-1B2887014F41}" type="slidenum">
+              <a:rPr lang="en-US" smtClean="0"/>
+              <a:t>39</a:t>
+            </a:fld>
+            <a:endParaRPr lang="en-US"/>
+          </a:p>
+        </p:txBody>
+      </p:sp>
+    </p:spTree>
+    <p:extLst>
+      <p:ext uri="{BB962C8B-B14F-4D97-AF65-F5344CB8AC3E}">
+        <p14:creationId xmlns:p14="http://schemas.microsoft.com/office/powerpoint/2010/main" val="2156997575"/>
       </p:ext>
     </p:extLst>
   </p:cSld>
@@ -8460,6 +9136,264 @@
     <p:extLst>
       <p:ext uri="{BB962C8B-B14F-4D97-AF65-F5344CB8AC3E}">
         <p14:creationId xmlns:p14="http://schemas.microsoft.com/office/powerpoint/2010/main" val="4169133123"/>
+      </p:ext>
+    </p:extLst>
+  </p:cSld>
+  <p:clrMapOvr>
+    <a:masterClrMapping/>
+  </p:clrMapOvr>
+</p:notes>
+</file>
+
+<file path=ppt/notesSlides/notesSlide30.xml><?xml version="1.0" encoding="utf-8"?>
+<p:notes xmlns:a="http://schemas.openxmlformats.org/drawingml/2006/main" xmlns:r="http://schemas.openxmlformats.org/officeDocument/2006/relationships" xmlns:p="http://schemas.openxmlformats.org/presentationml/2006/main">
+  <p:cSld>
+    <p:spTree>
+      <p:nvGrpSpPr>
+        <p:cNvPr id="1" name=""/>
+        <p:cNvGrpSpPr/>
+        <p:nvPr/>
+      </p:nvGrpSpPr>
+      <p:grpSpPr>
+        <a:xfrm>
+          <a:off x="0" y="0"/>
+          <a:ext cx="0" cy="0"/>
+          <a:chOff x="0" y="0"/>
+          <a:chExt cx="0" cy="0"/>
+        </a:xfrm>
+      </p:grpSpPr>
+      <p:sp>
+        <p:nvSpPr>
+          <p:cNvPr id="2" name="Slide Image Placeholder 1"/>
+          <p:cNvSpPr>
+            <a:spLocks noGrp="1" noRot="1" noChangeAspect="1"/>
+          </p:cNvSpPr>
+          <p:nvPr>
+            <p:ph type="sldImg"/>
+          </p:nvPr>
+        </p:nvSpPr>
+        <p:spPr/>
+      </p:sp>
+      <p:sp>
+        <p:nvSpPr>
+          <p:cNvPr id="3" name="Notes Placeholder 2"/>
+          <p:cNvSpPr>
+            <a:spLocks noGrp="1"/>
+          </p:cNvSpPr>
+          <p:nvPr>
+            <p:ph type="body" idx="1"/>
+          </p:nvPr>
+        </p:nvSpPr>
+        <p:spPr/>
+        <p:txBody>
+          <a:bodyPr/>
+          <a:lstStyle/>
+          <a:p>
+            <a:r>
+              <a:rPr lang="en-US" dirty="0"/>
+              <a:t>The students should pick a requirement based on their analysis. There is no correct answer as long as students are able to defend their choice.</a:t>
+            </a:r>
+          </a:p>
+        </p:txBody>
+      </p:sp>
+      <p:sp>
+        <p:nvSpPr>
+          <p:cNvPr id="4" name="Slide Number Placeholder 3"/>
+          <p:cNvSpPr>
+            <a:spLocks noGrp="1"/>
+          </p:cNvSpPr>
+          <p:nvPr>
+            <p:ph type="sldNum" sz="quarter" idx="5"/>
+          </p:nvPr>
+        </p:nvSpPr>
+        <p:spPr/>
+        <p:txBody>
+          <a:bodyPr/>
+          <a:lstStyle/>
+          <a:p>
+            <a:fld id="{07937F07-1250-4CCE-B198-1B2887014F41}" type="slidenum">
+              <a:rPr lang="en-US" smtClean="0"/>
+              <a:t>40</a:t>
+            </a:fld>
+            <a:endParaRPr lang="en-US"/>
+          </a:p>
+        </p:txBody>
+      </p:sp>
+    </p:spTree>
+    <p:extLst>
+      <p:ext uri="{BB962C8B-B14F-4D97-AF65-F5344CB8AC3E}">
+        <p14:creationId xmlns:p14="http://schemas.microsoft.com/office/powerpoint/2010/main" val="3505825141"/>
+      </p:ext>
+    </p:extLst>
+  </p:cSld>
+  <p:clrMapOvr>
+    <a:masterClrMapping/>
+  </p:clrMapOvr>
+</p:notes>
+</file>
+
+<file path=ppt/notesSlides/notesSlide31.xml><?xml version="1.0" encoding="utf-8"?>
+<p:notes xmlns:a="http://schemas.openxmlformats.org/drawingml/2006/main" xmlns:r="http://schemas.openxmlformats.org/officeDocument/2006/relationships" xmlns:p="http://schemas.openxmlformats.org/presentationml/2006/main">
+  <p:cSld>
+    <p:spTree>
+      <p:nvGrpSpPr>
+        <p:cNvPr id="1" name=""/>
+        <p:cNvGrpSpPr/>
+        <p:nvPr/>
+      </p:nvGrpSpPr>
+      <p:grpSpPr>
+        <a:xfrm>
+          <a:off x="0" y="0"/>
+          <a:ext cx="0" cy="0"/>
+          <a:chOff x="0" y="0"/>
+          <a:chExt cx="0" cy="0"/>
+        </a:xfrm>
+      </p:grpSpPr>
+      <p:sp>
+        <p:nvSpPr>
+          <p:cNvPr id="2" name="Slide Image Placeholder 1"/>
+          <p:cNvSpPr>
+            <a:spLocks noGrp="1" noRot="1" noChangeAspect="1"/>
+          </p:cNvSpPr>
+          <p:nvPr>
+            <p:ph type="sldImg"/>
+          </p:nvPr>
+        </p:nvSpPr>
+        <p:spPr/>
+      </p:sp>
+      <p:sp>
+        <p:nvSpPr>
+          <p:cNvPr id="3" name="Notes Placeholder 2"/>
+          <p:cNvSpPr>
+            <a:spLocks noGrp="1"/>
+          </p:cNvSpPr>
+          <p:nvPr>
+            <p:ph type="body" idx="1"/>
+          </p:nvPr>
+        </p:nvSpPr>
+        <p:spPr/>
+        <p:txBody>
+          <a:bodyPr/>
+          <a:lstStyle/>
+          <a:p>
+            <a:r>
+              <a:rPr lang="en-US" dirty="0"/>
+              <a:t>This is an after-class activity.</a:t>
+            </a:r>
+          </a:p>
+        </p:txBody>
+      </p:sp>
+      <p:sp>
+        <p:nvSpPr>
+          <p:cNvPr id="4" name="Slide Number Placeholder 3"/>
+          <p:cNvSpPr>
+            <a:spLocks noGrp="1"/>
+          </p:cNvSpPr>
+          <p:nvPr>
+            <p:ph type="sldNum" sz="quarter" idx="5"/>
+          </p:nvPr>
+        </p:nvSpPr>
+        <p:spPr/>
+        <p:txBody>
+          <a:bodyPr/>
+          <a:lstStyle/>
+          <a:p>
+            <a:fld id="{07937F07-1250-4CCE-B198-1B2887014F41}" type="slidenum">
+              <a:rPr lang="en-US" smtClean="0"/>
+              <a:t>41</a:t>
+            </a:fld>
+            <a:endParaRPr lang="en-US"/>
+          </a:p>
+        </p:txBody>
+      </p:sp>
+    </p:spTree>
+    <p:extLst>
+      <p:ext uri="{BB962C8B-B14F-4D97-AF65-F5344CB8AC3E}">
+        <p14:creationId xmlns:p14="http://schemas.microsoft.com/office/powerpoint/2010/main" val="1375674159"/>
+      </p:ext>
+    </p:extLst>
+  </p:cSld>
+  <p:clrMapOvr>
+    <a:masterClrMapping/>
+  </p:clrMapOvr>
+</p:notes>
+</file>
+
+<file path=ppt/notesSlides/notesSlide32.xml><?xml version="1.0" encoding="utf-8"?>
+<p:notes xmlns:a="http://schemas.openxmlformats.org/drawingml/2006/main" xmlns:r="http://schemas.openxmlformats.org/officeDocument/2006/relationships" xmlns:p="http://schemas.openxmlformats.org/presentationml/2006/main">
+  <p:cSld>
+    <p:spTree>
+      <p:nvGrpSpPr>
+        <p:cNvPr id="1" name=""/>
+        <p:cNvGrpSpPr/>
+        <p:nvPr/>
+      </p:nvGrpSpPr>
+      <p:grpSpPr>
+        <a:xfrm>
+          <a:off x="0" y="0"/>
+          <a:ext cx="0" cy="0"/>
+          <a:chOff x="0" y="0"/>
+          <a:chExt cx="0" cy="0"/>
+        </a:xfrm>
+      </p:grpSpPr>
+      <p:sp>
+        <p:nvSpPr>
+          <p:cNvPr id="2" name="Slide Image Placeholder 1"/>
+          <p:cNvSpPr>
+            <a:spLocks noGrp="1" noRot="1" noChangeAspect="1"/>
+          </p:cNvSpPr>
+          <p:nvPr>
+            <p:ph type="sldImg"/>
+          </p:nvPr>
+        </p:nvSpPr>
+        <p:spPr/>
+      </p:sp>
+      <p:sp>
+        <p:nvSpPr>
+          <p:cNvPr id="3" name="Notes Placeholder 2"/>
+          <p:cNvSpPr>
+            <a:spLocks noGrp="1"/>
+          </p:cNvSpPr>
+          <p:nvPr>
+            <p:ph type="body" idx="1"/>
+          </p:nvPr>
+        </p:nvSpPr>
+        <p:spPr/>
+        <p:txBody>
+          <a:bodyPr/>
+          <a:lstStyle/>
+          <a:p>
+            <a:endParaRPr lang="en-US" dirty="0"/>
+          </a:p>
+        </p:txBody>
+      </p:sp>
+      <p:sp>
+        <p:nvSpPr>
+          <p:cNvPr id="4" name="Slide Number Placeholder 3"/>
+          <p:cNvSpPr>
+            <a:spLocks noGrp="1"/>
+          </p:cNvSpPr>
+          <p:nvPr>
+            <p:ph type="sldNum" sz="quarter" idx="5"/>
+          </p:nvPr>
+        </p:nvSpPr>
+        <p:spPr/>
+        <p:txBody>
+          <a:bodyPr/>
+          <a:lstStyle/>
+          <a:p>
+            <a:fld id="{07937F07-1250-4CCE-B198-1B2887014F41}" type="slidenum">
+              <a:rPr lang="en-US" smtClean="0"/>
+              <a:t>42</a:t>
+            </a:fld>
+            <a:endParaRPr lang="en-US"/>
+          </a:p>
+        </p:txBody>
+      </p:sp>
+    </p:spTree>
+    <p:extLst>
+      <p:ext uri="{BB962C8B-B14F-4D97-AF65-F5344CB8AC3E}">
+        <p14:creationId xmlns:p14="http://schemas.microsoft.com/office/powerpoint/2010/main" val="1604120877"/>
       </p:ext>
     </p:extLst>
   </p:cSld>
@@ -9447,7 +10381,7 @@
           <a:p>
             <a:fld id="{5D2A64DE-480B-420F-9649-4F8E696E08E0}" type="datetime1">
               <a:rPr lang="en-US" smtClean="0"/>
-              <a:t>6/5/2025</a:t>
+              <a:t>6/25/25</a:t>
             </a:fld>
             <a:endParaRPr lang="en-US"/>
           </a:p>
@@ -9771,7 +10705,7 @@
           <a:p>
             <a:fld id="{EA476A42-A091-4468-A075-64A31BE59948}" type="datetime1">
               <a:rPr lang="en-US" smtClean="0"/>
-              <a:t>6/5/2025</a:t>
+              <a:t>6/25/25</a:t>
             </a:fld>
             <a:endParaRPr lang="en-US"/>
           </a:p>
@@ -9969,7 +10903,7 @@
           <a:p>
             <a:fld id="{0D3616D0-8311-4107-9726-6B805E7D05BA}" type="datetime1">
               <a:rPr lang="en-US" smtClean="0"/>
-              <a:t>6/5/2025</a:t>
+              <a:t>6/25/25</a:t>
             </a:fld>
             <a:endParaRPr lang="en-US"/>
           </a:p>
@@ -10177,7 +11111,7 @@
           <a:p>
             <a:fld id="{3BC2557A-5C88-417A-A763-5AC779462A5F}" type="datetime1">
               <a:rPr lang="en-US" smtClean="0"/>
-              <a:t>6/5/2025</a:t>
+              <a:t>6/25/25</a:t>
             </a:fld>
             <a:endParaRPr lang="en-US"/>
           </a:p>
@@ -10701,7 +11635,7 @@
           <a:p>
             <a:fld id="{07C7BFD4-467E-4EDE-93EA-052F5B39A4E5}" type="datetime1">
               <a:rPr lang="en-US" smtClean="0"/>
-              <a:t>6/5/2025</a:t>
+              <a:t>6/25/25</a:t>
             </a:fld>
             <a:endParaRPr lang="en-US"/>
           </a:p>
@@ -10951,7 +11885,7 @@
           <a:p>
             <a:fld id="{07C7BFD4-467E-4EDE-93EA-052F5B39A4E5}" type="datetime1">
               <a:rPr lang="en-US" smtClean="0"/>
-              <a:t>6/5/2025</a:t>
+              <a:t>6/25/25</a:t>
             </a:fld>
             <a:endParaRPr lang="en-US"/>
           </a:p>
@@ -11133,7 +12067,7 @@
           <a:p>
             <a:fld id="{109E55A0-C911-4F03-82FC-7E5926047D46}" type="datetime1">
               <a:rPr lang="en-US" smtClean="0"/>
-              <a:t>6/5/2025</a:t>
+              <a:t>6/25/25</a:t>
             </a:fld>
             <a:endParaRPr lang="en-US"/>
           </a:p>
@@ -11446,7 +12380,7 @@
           <a:p>
             <a:fld id="{A533CBE2-D5BE-47AC-ADC2-9CDFC1D0CF90}" type="datetime1">
               <a:rPr lang="en-US" smtClean="0"/>
-              <a:t>6/5/2025</a:t>
+              <a:t>6/25/25</a:t>
             </a:fld>
             <a:endParaRPr lang="en-US"/>
           </a:p>
@@ -11747,7 +12681,7 @@
           <a:p>
             <a:fld id="{39B7EDB1-CE74-4951-85A2-0B01C2128E28}" type="datetime1">
               <a:rPr lang="en-US" smtClean="0"/>
-              <a:t>6/5/2025</a:t>
+              <a:t>6/25/25</a:t>
             </a:fld>
             <a:endParaRPr lang="en-US"/>
           </a:p>
@@ -12195,7 +13129,7 @@
           <a:p>
             <a:fld id="{2BC7EB92-A5C2-4807-A9DC-9EDE6CBFB241}" type="datetime1">
               <a:rPr lang="en-US" smtClean="0"/>
-              <a:t>6/5/2025</a:t>
+              <a:t>6/25/25</a:t>
             </a:fld>
             <a:endParaRPr lang="en-US"/>
           </a:p>
@@ -12308,7 +13242,7 @@
           <a:p>
             <a:fld id="{2B7B7EE0-7771-4CD5-9B2B-3550753A54A1}" type="datetime1">
               <a:rPr lang="en-US" smtClean="0"/>
-              <a:t>6/5/2025</a:t>
+              <a:t>6/25/25</a:t>
             </a:fld>
             <a:endParaRPr lang="en-US"/>
           </a:p>
@@ -12619,7 +13553,7 @@
           <a:p>
             <a:fld id="{F8B318B3-0E87-4416-A9B8-D891968C2727}" type="datetime1">
               <a:rPr lang="en-US" smtClean="0"/>
-              <a:t>6/5/2025</a:t>
+              <a:t>6/25/25</a:t>
             </a:fld>
             <a:endParaRPr lang="en-US"/>
           </a:p>
@@ -12860,7 +13794,7 @@
           <a:p>
             <a:fld id="{54D997E8-DDEE-43F1-8D9B-F8A1E11DE488}" type="datetime1">
               <a:rPr lang="en-US" smtClean="0"/>
-              <a:t>6/5/2025</a:t>
+              <a:t>6/25/25</a:t>
             </a:fld>
             <a:endParaRPr lang="en-US"/>
           </a:p>
@@ -18690,7 +19624,7 @@
           <p:cNvPr id="2" name="Title 1">
             <a:extLst>
               <a:ext uri="{FF2B5EF4-FFF2-40B4-BE49-F238E27FC236}">
-                <a16:creationId xmlns:a16="http://schemas.microsoft.com/office/drawing/2014/main" id="{E743D407-5B53-49A7-9907-E801EA7FFD8E}"/>
+                <a16:creationId xmlns:a16="http://schemas.microsoft.com/office/drawing/2014/main" id="{6D7FE7B3-C6CB-6B03-07B9-822FC3676710}"/>
               </a:ext>
             </a:extLst>
           </p:cNvPr>
@@ -18708,7 +19642,7 @@
           <a:p>
             <a:r>
               <a:rPr lang="en-US" dirty="0"/>
-              <a:t>Learning Goals for this Lesson</a:t>
+              <a:t>The Importance of Ethics</a:t>
             </a:r>
           </a:p>
         </p:txBody>
@@ -18718,7 +19652,7 @@
           <p:cNvPr id="3" name="Content Placeholder 2">
             <a:extLst>
               <a:ext uri="{FF2B5EF4-FFF2-40B4-BE49-F238E27FC236}">
-                <a16:creationId xmlns:a16="http://schemas.microsoft.com/office/drawing/2014/main" id="{AC300E2B-BFD0-4090-AFC5-FE82683F997F}"/>
+                <a16:creationId xmlns:a16="http://schemas.microsoft.com/office/drawing/2014/main" id="{B78E0F47-C40D-AF55-04F9-C6043963616F}"/>
               </a:ext>
             </a:extLst>
           </p:cNvPr>
@@ -18731,8 +19665,8 @@
         </p:nvSpPr>
         <p:spPr>
           <a:xfrm>
-            <a:off x="838199" y="1500160"/>
-            <a:ext cx="10515599" cy="4351338"/>
+            <a:off x="838200" y="1500160"/>
+            <a:ext cx="10400414" cy="4351338"/>
           </a:xfrm>
         </p:spPr>
         <p:txBody>
@@ -18741,35 +19675,55 @@
           <a:p>
             <a:r>
               <a:rPr lang="en-US" dirty="0"/>
-              <a:t>At the end of this lesson, you should be able to</a:t>
-            </a:r>
-          </a:p>
-          <a:p>
-            <a:pPr lvl="1"/>
-            <a:r>
-              <a:rPr lang="en-US" dirty="0"/>
-              <a:t>Explain the overall purposes of requirements analysis</a:t>
-            </a:r>
-          </a:p>
-          <a:p>
-            <a:pPr lvl="1"/>
-            <a:r>
-              <a:rPr lang="en-US" dirty="0"/>
-              <a:t>Enumerate and explain 3 major dimensions of risk in Requirements Analysis</a:t>
-            </a:r>
-          </a:p>
-          <a:p>
-            <a:pPr lvl="1"/>
-            <a:r>
-              <a:rPr lang="en-US" dirty="0"/>
-              <a:t>Explain the difference between functional and non-functional requirements, and give examples of each  </a:t>
-            </a:r>
-          </a:p>
-          <a:p>
-            <a:pPr lvl="1"/>
-            <a:r>
-              <a:rPr lang="en-US" dirty="0"/>
-              <a:t>Define the notions of user stories and conditions of satisfaction, and give multiple examples</a:t>
+              <a:t>Technology is the result of human imagination</a:t>
+            </a:r>
+          </a:p>
+          <a:p>
+            <a:r>
+              <a:rPr lang="en-US" b="1" dirty="0"/>
+              <a:t>All</a:t>
+            </a:r>
+            <a:r>
+              <a:rPr lang="en-US" dirty="0"/>
+              <a:t> technology involves design all design involves choices among possible options</a:t>
+            </a:r>
+          </a:p>
+          <a:p>
+            <a:r>
+              <a:rPr lang="en-US" dirty="0"/>
+              <a:t>All design reflects </a:t>
+            </a:r>
+            <a:r>
+              <a:rPr lang="en-US" b="1" dirty="0"/>
+              <a:t>values</a:t>
+            </a:r>
+          </a:p>
+          <a:p>
+            <a:r>
+              <a:rPr lang="en-US" dirty="0"/>
+              <a:t>Therefore, </a:t>
+            </a:r>
+            <a:r>
+              <a:rPr lang="en-US" b="1" dirty="0"/>
+              <a:t>technologies </a:t>
+            </a:r>
+            <a:r>
+              <a:rPr lang="en-US" dirty="0"/>
+              <a:t>reflect and affect human values</a:t>
+            </a:r>
+          </a:p>
+          <a:p>
+            <a:r>
+              <a:rPr lang="en-US" dirty="0"/>
+              <a:t>Ignoring values in the requirements and design process is </a:t>
+            </a:r>
+            <a:r>
+              <a:rPr lang="en-US" b="1" dirty="0"/>
+              <a:t>irresponsible</a:t>
+            </a:r>
+            <a:r>
+              <a:rPr lang="en-US" dirty="0"/>
+              <a:t>.</a:t>
             </a:r>
           </a:p>
         </p:txBody>
@@ -18779,7 +19733,7 @@
           <p:cNvPr id="4" name="Slide Number Placeholder 3">
             <a:extLst>
               <a:ext uri="{FF2B5EF4-FFF2-40B4-BE49-F238E27FC236}">
-                <a16:creationId xmlns:a16="http://schemas.microsoft.com/office/drawing/2014/main" id="{B7BF3F82-6F96-41E0-9C15-23CE00076176}"/>
+                <a16:creationId xmlns:a16="http://schemas.microsoft.com/office/drawing/2014/main" id="{F781C33C-0916-3DED-5FA4-D82F64A35D84}"/>
               </a:ext>
             </a:extLst>
           </p:cNvPr>
@@ -18806,7 +19760,7 @@
     </p:spTree>
     <p:extLst>
       <p:ext uri="{BB962C8B-B14F-4D97-AF65-F5344CB8AC3E}">
-        <p14:creationId xmlns:p14="http://schemas.microsoft.com/office/powerpoint/2010/main" val="673410589"/>
+        <p14:creationId xmlns:p14="http://schemas.microsoft.com/office/powerpoint/2010/main" val="4059357005"/>
       </p:ext>
     </p:extLst>
   </p:cSld>
@@ -18838,7 +19792,7 @@
           <p:cNvPr id="2" name="Title 1">
             <a:extLst>
               <a:ext uri="{FF2B5EF4-FFF2-40B4-BE49-F238E27FC236}">
-                <a16:creationId xmlns:a16="http://schemas.microsoft.com/office/drawing/2014/main" id="{6D7FE7B3-C6CB-6B03-07B9-822FC3676710}"/>
+                <a16:creationId xmlns:a16="http://schemas.microsoft.com/office/drawing/2014/main" id="{C2EB4C0D-B7BA-2B69-235B-3C7F599C7C4D}"/>
               </a:ext>
             </a:extLst>
           </p:cNvPr>
@@ -18856,7 +19810,7 @@
           <a:p>
             <a:r>
               <a:rPr lang="en-US" dirty="0"/>
-              <a:t>Ethics and Value Sensitive Design</a:t>
+              <a:t>Informed Consent Online</a:t>
             </a:r>
           </a:p>
         </p:txBody>
@@ -18866,7 +19820,7 @@
           <p:cNvPr id="3" name="Content Placeholder 2">
             <a:extLst>
               <a:ext uri="{FF2B5EF4-FFF2-40B4-BE49-F238E27FC236}">
-                <a16:creationId xmlns:a16="http://schemas.microsoft.com/office/drawing/2014/main" id="{B78E0F47-C40D-AF55-04F9-C6043963616F}"/>
+                <a16:creationId xmlns:a16="http://schemas.microsoft.com/office/drawing/2014/main" id="{76701B85-522F-923C-BFFD-0769C582733A}"/>
               </a:ext>
             </a:extLst>
           </p:cNvPr>
@@ -18880,64 +19834,91 @@
         <p:spPr>
           <a:xfrm>
             <a:off x="838200" y="1500160"/>
-            <a:ext cx="10400414" cy="4351338"/>
+            <a:ext cx="8648700" cy="4351338"/>
           </a:xfrm>
         </p:spPr>
         <p:txBody>
-          <a:bodyPr/>
+          <a:bodyPr>
+            <a:normAutofit fontScale="92500" lnSpcReduction="20000"/>
+          </a:bodyPr>
           <a:lstStyle/>
           <a:p>
             <a:r>
               <a:rPr lang="en-US" dirty="0"/>
-              <a:t>Technology is the result of human imagination</a:t>
+              <a:t>Information technologies collect vast amounts of information about users and their interactions.</a:t>
+            </a:r>
+          </a:p>
+          <a:p>
+            <a:r>
+              <a:rPr lang="en-US" dirty="0"/>
+              <a:t>Often users have no control over</a:t>
+            </a:r>
+          </a:p>
+          <a:p>
+            <a:pPr lvl="1"/>
+            <a:r>
+              <a:rPr lang="en-US" dirty="0"/>
+              <a:t>What information is collected</a:t>
+            </a:r>
+          </a:p>
+          <a:p>
+            <a:pPr lvl="1"/>
+            <a:r>
+              <a:rPr lang="en-US" dirty="0"/>
+              <a:t>Who will have access</a:t>
+            </a:r>
+          </a:p>
+          <a:p>
+            <a:pPr lvl="1"/>
+            <a:r>
+              <a:rPr lang="en-US" dirty="0"/>
+              <a:t>How long will it be archived</a:t>
+            </a:r>
+          </a:p>
+          <a:p>
+            <a:pPr lvl="1"/>
+            <a:r>
+              <a:rPr lang="en-US" dirty="0"/>
+              <a:t>What will it be used for</a:t>
+            </a:r>
+          </a:p>
+          <a:p>
+            <a:pPr lvl="1"/>
+            <a:r>
+              <a:rPr lang="en-US" dirty="0"/>
+              <a:t>Will the identity be protected</a:t>
             </a:r>
           </a:p>
           <a:p>
             <a:r>
               <a:rPr lang="en-US" b="1" dirty="0"/>
-              <a:t>All</a:t>
-            </a:r>
-            <a:r>
-              <a:rPr lang="en-US" dirty="0"/>
-              <a:t> technology involves design all design involves choices among possible options</a:t>
-            </a:r>
-          </a:p>
-          <a:p>
-            <a:r>
-              <a:rPr lang="en-US" dirty="0"/>
-              <a:t>All design reflects </a:t>
-            </a:r>
-            <a:r>
-              <a:rPr lang="en-US" b="1" dirty="0"/>
-              <a:t>values</a:t>
-            </a:r>
-          </a:p>
-          <a:p>
-            <a:r>
-              <a:rPr lang="en-US" dirty="0"/>
-              <a:t>Therefore, </a:t>
-            </a:r>
-            <a:r>
-              <a:rPr lang="en-US" b="1" dirty="0"/>
-              <a:t>technologies </a:t>
-            </a:r>
-            <a:r>
-              <a:rPr lang="en-US" dirty="0"/>
-              <a:t>reflect and affect human values</a:t>
-            </a:r>
-          </a:p>
-          <a:p>
-            <a:r>
-              <a:rPr lang="en-US" dirty="0"/>
-              <a:t>Ignoring values in the requirements and design process is </a:t>
-            </a:r>
-            <a:r>
-              <a:rPr lang="en-US" b="1" dirty="0"/>
-              <a:t>irresponsible</a:t>
-            </a:r>
-            <a:r>
-              <a:rPr lang="en-US" dirty="0"/>
-              <a:t>.</a:t>
+              <a:t>Informed consent</a:t>
+            </a:r>
+            <a:r>
+              <a:rPr lang="en-US" dirty="0"/>
+              <a:t> is one way to modulate the impact of this data collection.</a:t>
+            </a:r>
+          </a:p>
+          <a:p>
+            <a:r>
+              <a:rPr lang="en-US" dirty="0"/>
+              <a:t>Web </a:t>
+            </a:r>
+            <a:r>
+              <a:rPr lang="en-US" i="1" dirty="0"/>
+              <a:t>cookies</a:t>
+            </a:r>
+            <a:r>
+              <a:rPr lang="en-US" dirty="0"/>
+              <a:t> and </a:t>
+            </a:r>
+            <a:r>
+              <a:rPr lang="en-US" i="1" dirty="0"/>
+              <a:t>browser security</a:t>
+            </a:r>
+            <a:r>
+              <a:rPr lang="en-US" dirty="0"/>
+              <a:t> mechanisms represent solutions to implement the principle of informed consent.  </a:t>
             </a:r>
           </a:p>
         </p:txBody>
@@ -18947,7 +19928,7 @@
           <p:cNvPr id="4" name="Slide Number Placeholder 3">
             <a:extLst>
               <a:ext uri="{FF2B5EF4-FFF2-40B4-BE49-F238E27FC236}">
-                <a16:creationId xmlns:a16="http://schemas.microsoft.com/office/drawing/2014/main" id="{F781C33C-0916-3DED-5FA4-D82F64A35D84}"/>
+                <a16:creationId xmlns:a16="http://schemas.microsoft.com/office/drawing/2014/main" id="{334DFB7C-50AD-725A-7432-FC7C11ED7DA7}"/>
               </a:ext>
             </a:extLst>
           </p:cNvPr>
@@ -18974,7 +19955,7 @@
     </p:spTree>
     <p:extLst>
       <p:ext uri="{BB962C8B-B14F-4D97-AF65-F5344CB8AC3E}">
-        <p14:creationId xmlns:p14="http://schemas.microsoft.com/office/powerpoint/2010/main" val="4059357005"/>
+        <p14:creationId xmlns:p14="http://schemas.microsoft.com/office/powerpoint/2010/main" val="3280225519"/>
       </p:ext>
     </p:extLst>
   </p:cSld>
@@ -19006,7 +19987,7 @@
           <p:cNvPr id="2" name="Title 1">
             <a:extLst>
               <a:ext uri="{FF2B5EF4-FFF2-40B4-BE49-F238E27FC236}">
-                <a16:creationId xmlns:a16="http://schemas.microsoft.com/office/drawing/2014/main" id="{C2EB4C0D-B7BA-2B69-235B-3C7F599C7C4D}"/>
+                <a16:creationId xmlns:a16="http://schemas.microsoft.com/office/drawing/2014/main" id="{A1BC45B7-C3B3-528F-B1BB-79C1B4293EE0}"/>
               </a:ext>
             </a:extLst>
           </p:cNvPr>
@@ -19024,290 +20005,7 @@
           <a:p>
             <a:r>
               <a:rPr lang="en-US" dirty="0"/>
-              <a:t>Ethics and Value Sensitive Design</a:t>
-            </a:r>
-          </a:p>
-        </p:txBody>
-      </p:sp>
-      <p:sp>
-        <p:nvSpPr>
-          <p:cNvPr id="3" name="Content Placeholder 2">
-            <a:extLst>
-              <a:ext uri="{FF2B5EF4-FFF2-40B4-BE49-F238E27FC236}">
-                <a16:creationId xmlns:a16="http://schemas.microsoft.com/office/drawing/2014/main" id="{76701B85-522F-923C-BFFD-0769C582733A}"/>
-              </a:ext>
-            </a:extLst>
-          </p:cNvPr>
-          <p:cNvSpPr>
-            <a:spLocks noGrp="1"/>
-          </p:cNvSpPr>
-          <p:nvPr>
-            <p:ph idx="1"/>
-          </p:nvPr>
-        </p:nvSpPr>
-        <p:spPr/>
-        <p:txBody>
-          <a:bodyPr/>
-          <a:lstStyle/>
-          <a:p>
-            <a:r>
-              <a:rPr lang="en-US" dirty="0"/>
-              <a:t>Briefly describe a case study to illustrate the role of ethics in VSD. Some examples are but not limited to</a:t>
-            </a:r>
-          </a:p>
-          <a:p>
-            <a:pPr lvl="1"/>
-            <a:r>
-              <a:rPr lang="en-US" dirty="0"/>
-              <a:t>The Facebook like Button</a:t>
-            </a:r>
-          </a:p>
-          <a:p>
-            <a:pPr lvl="1"/>
-            <a:r>
-              <a:rPr lang="en-US" dirty="0"/>
-              <a:t>Cookies in browsers</a:t>
-            </a:r>
-          </a:p>
-          <a:p>
-            <a:pPr lvl="1"/>
-            <a:r>
-              <a:rPr lang="en-US" dirty="0"/>
-              <a:t>Feel free to think of more . . .</a:t>
-            </a:r>
-          </a:p>
-        </p:txBody>
-      </p:sp>
-      <p:sp>
-        <p:nvSpPr>
-          <p:cNvPr id="4" name="Slide Number Placeholder 3">
-            <a:extLst>
-              <a:ext uri="{FF2B5EF4-FFF2-40B4-BE49-F238E27FC236}">
-                <a16:creationId xmlns:a16="http://schemas.microsoft.com/office/drawing/2014/main" id="{334DFB7C-50AD-725A-7432-FC7C11ED7DA7}"/>
-              </a:ext>
-            </a:extLst>
-          </p:cNvPr>
-          <p:cNvSpPr>
-            <a:spLocks noGrp="1"/>
-          </p:cNvSpPr>
-          <p:nvPr>
-            <p:ph type="sldNum" sz="quarter" idx="12"/>
-          </p:nvPr>
-        </p:nvSpPr>
-        <p:spPr/>
-        <p:txBody>
-          <a:bodyPr/>
-          <a:lstStyle/>
-          <a:p>
-            <a:fld id="{20F37917-FD3A-4669-9018-DA04BCDD3D75}" type="slidenum">
-              <a:rPr lang="en-US" smtClean="0"/>
-              <a:t>34</a:t>
-            </a:fld>
-            <a:endParaRPr lang="en-US"/>
-          </a:p>
-        </p:txBody>
-      </p:sp>
-    </p:spTree>
-    <p:extLst>
-      <p:ext uri="{BB962C8B-B14F-4D97-AF65-F5344CB8AC3E}">
-        <p14:creationId xmlns:p14="http://schemas.microsoft.com/office/powerpoint/2010/main" val="3280225519"/>
-      </p:ext>
-    </p:extLst>
-  </p:cSld>
-  <p:clrMapOvr>
-    <a:masterClrMapping/>
-  </p:clrMapOvr>
-</p:sld>
-</file>
-
-<file path=ppt/slides/slide35.xml><?xml version="1.0" encoding="utf-8"?>
-<p:sld xmlns:a="http://schemas.openxmlformats.org/drawingml/2006/main" xmlns:r="http://schemas.openxmlformats.org/officeDocument/2006/relationships" xmlns:p="http://schemas.openxmlformats.org/presentationml/2006/main">
-  <p:cSld>
-    <p:spTree>
-      <p:nvGrpSpPr>
-        <p:cNvPr id="1" name=""/>
-        <p:cNvGrpSpPr/>
-        <p:nvPr/>
-      </p:nvGrpSpPr>
-      <p:grpSpPr>
-        <a:xfrm>
-          <a:off x="0" y="0"/>
-          <a:ext cx="0" cy="0"/>
-          <a:chOff x="0" y="0"/>
-          <a:chExt cx="0" cy="0"/>
-        </a:xfrm>
-      </p:grpSpPr>
-      <p:sp>
-        <p:nvSpPr>
-          <p:cNvPr id="2" name="Title 1">
-            <a:extLst>
-              <a:ext uri="{FF2B5EF4-FFF2-40B4-BE49-F238E27FC236}">
-                <a16:creationId xmlns:a16="http://schemas.microsoft.com/office/drawing/2014/main" id="{ECD5C6A6-5DF9-60A4-B8BB-1393E176932C}"/>
-              </a:ext>
-            </a:extLst>
-          </p:cNvPr>
-          <p:cNvSpPr>
-            <a:spLocks noGrp="1"/>
-          </p:cNvSpPr>
-          <p:nvPr>
-            <p:ph type="title"/>
-          </p:nvPr>
-        </p:nvSpPr>
-        <p:spPr/>
-        <p:txBody>
-          <a:bodyPr/>
-          <a:lstStyle/>
-          <a:p>
-            <a:r>
-              <a:rPr lang="en-US" dirty="0"/>
-              <a:t>Value Sensitive Design (VSD)</a:t>
-            </a:r>
-          </a:p>
-        </p:txBody>
-      </p:sp>
-      <p:sp>
-        <p:nvSpPr>
-          <p:cNvPr id="3" name="Content Placeholder 2">
-            <a:extLst>
-              <a:ext uri="{FF2B5EF4-FFF2-40B4-BE49-F238E27FC236}">
-                <a16:creationId xmlns:a16="http://schemas.microsoft.com/office/drawing/2014/main" id="{B0684EA3-7340-24A6-013C-665AAFD49E3C}"/>
-              </a:ext>
-            </a:extLst>
-          </p:cNvPr>
-          <p:cNvSpPr>
-            <a:spLocks noGrp="1"/>
-          </p:cNvSpPr>
-          <p:nvPr>
-            <p:ph idx="1"/>
-          </p:nvPr>
-        </p:nvSpPr>
-        <p:spPr/>
-        <p:txBody>
-          <a:bodyPr/>
-          <a:lstStyle/>
-          <a:p>
-            <a:pPr>
-              <a:buFont typeface="Wingdings" pitchFamily="2" charset="2"/>
-              <a:buChar char="Ø"/>
-            </a:pPr>
-            <a:r>
-              <a:rPr lang="en-US" dirty="0"/>
-              <a:t>The design of technology is informed by values.</a:t>
-            </a:r>
-          </a:p>
-          <a:p>
-            <a:pPr marL="0" indent="0">
-              <a:buNone/>
-            </a:pPr>
-            <a:endParaRPr lang="en-US" dirty="0"/>
-          </a:p>
-          <a:p>
-            <a:pPr>
-              <a:buFont typeface="Wingdings" pitchFamily="2" charset="2"/>
-              <a:buChar char="Ø"/>
-            </a:pPr>
-            <a:r>
-              <a:rPr lang="en-US" dirty="0"/>
-              <a:t>The design of technology can help realize values or frustrate the realization of values.</a:t>
-            </a:r>
-          </a:p>
-          <a:p>
-            <a:pPr marL="0" indent="0">
-              <a:buNone/>
-            </a:pPr>
-            <a:endParaRPr lang="en-US" dirty="0"/>
-          </a:p>
-          <a:p>
-            <a:pPr marL="0" indent="0">
-              <a:buNone/>
-            </a:pPr>
-            <a:endParaRPr lang="en-US" dirty="0"/>
-          </a:p>
-        </p:txBody>
-      </p:sp>
-      <p:sp>
-        <p:nvSpPr>
-          <p:cNvPr id="4" name="Slide Number Placeholder 3">
-            <a:extLst>
-              <a:ext uri="{FF2B5EF4-FFF2-40B4-BE49-F238E27FC236}">
-                <a16:creationId xmlns:a16="http://schemas.microsoft.com/office/drawing/2014/main" id="{86EB4CAF-E90E-E020-3B21-F72456C65105}"/>
-              </a:ext>
-            </a:extLst>
-          </p:cNvPr>
-          <p:cNvSpPr>
-            <a:spLocks noGrp="1"/>
-          </p:cNvSpPr>
-          <p:nvPr>
-            <p:ph type="sldNum" sz="quarter" idx="12"/>
-          </p:nvPr>
-        </p:nvSpPr>
-        <p:spPr/>
-        <p:txBody>
-          <a:bodyPr/>
-          <a:lstStyle/>
-          <a:p>
-            <a:fld id="{20F37917-FD3A-4669-9018-DA04BCDD3D75}" type="slidenum">
-              <a:rPr lang="en-US" smtClean="0"/>
-              <a:t>35</a:t>
-            </a:fld>
-            <a:endParaRPr lang="en-US"/>
-          </a:p>
-        </p:txBody>
-      </p:sp>
-    </p:spTree>
-    <p:extLst>
-      <p:ext uri="{BB962C8B-B14F-4D97-AF65-F5344CB8AC3E}">
-        <p14:creationId xmlns:p14="http://schemas.microsoft.com/office/powerpoint/2010/main" val="1527192930"/>
-      </p:ext>
-    </p:extLst>
-  </p:cSld>
-  <p:clrMapOvr>
-    <a:masterClrMapping/>
-  </p:clrMapOvr>
-</p:sld>
-</file>
-
-<file path=ppt/slides/slide36.xml><?xml version="1.0" encoding="utf-8"?>
-<p:sld xmlns:a="http://schemas.openxmlformats.org/drawingml/2006/main" xmlns:r="http://schemas.openxmlformats.org/officeDocument/2006/relationships" xmlns:p="http://schemas.openxmlformats.org/presentationml/2006/main">
-  <p:cSld>
-    <p:spTree>
-      <p:nvGrpSpPr>
-        <p:cNvPr id="1" name=""/>
-        <p:cNvGrpSpPr/>
-        <p:nvPr/>
-      </p:nvGrpSpPr>
-      <p:grpSpPr>
-        <a:xfrm>
-          <a:off x="0" y="0"/>
-          <a:ext cx="0" cy="0"/>
-          <a:chOff x="0" y="0"/>
-          <a:chExt cx="0" cy="0"/>
-        </a:xfrm>
-      </p:grpSpPr>
-      <p:sp>
-        <p:nvSpPr>
-          <p:cNvPr id="2" name="Title 1">
-            <a:extLst>
-              <a:ext uri="{FF2B5EF4-FFF2-40B4-BE49-F238E27FC236}">
-                <a16:creationId xmlns:a16="http://schemas.microsoft.com/office/drawing/2014/main" id="{A1BC45B7-C3B3-528F-B1BB-79C1B4293EE0}"/>
-              </a:ext>
-            </a:extLst>
-          </p:cNvPr>
-          <p:cNvSpPr>
-            <a:spLocks noGrp="1"/>
-          </p:cNvSpPr>
-          <p:nvPr>
-            <p:ph type="title"/>
-          </p:nvPr>
-        </p:nvSpPr>
-        <p:spPr/>
-        <p:txBody>
-          <a:bodyPr/>
-          <a:lstStyle/>
-          <a:p>
-            <a:r>
-              <a:rPr lang="en-US" dirty="0"/>
-              <a:t>VSD in Brief</a:t>
+              <a:t>Value Sensitive Design (VSD) in Brief</a:t>
             </a:r>
           </a:p>
         </p:txBody>
@@ -19461,7 +20159,7 @@
           <a:p>
             <a:fld id="{20F37917-FD3A-4669-9018-DA04BCDD3D75}" type="slidenum">
               <a:rPr lang="en-US" smtClean="0"/>
-              <a:t>36</a:t>
+              <a:t>34</a:t>
             </a:fld>
             <a:endParaRPr lang="en-US"/>
           </a:p>
@@ -19733,7 +20431,7 @@
 </p:sld>
 </file>
 
-<file path=ppt/slides/slide37.xml><?xml version="1.0" encoding="utf-8"?>
+<file path=ppt/slides/slide35.xml><?xml version="1.0" encoding="utf-8"?>
 <p:sld xmlns:a="http://schemas.openxmlformats.org/drawingml/2006/main" xmlns:r="http://schemas.openxmlformats.org/officeDocument/2006/relationships" xmlns:p="http://schemas.openxmlformats.org/presentationml/2006/main">
   <p:cSld>
     <p:spTree>
@@ -19902,7 +20600,7 @@
           <a:p>
             <a:fld id="{20F37917-FD3A-4669-9018-DA04BCDD3D75}" type="slidenum">
               <a:rPr lang="en-US" smtClean="0"/>
-              <a:t>37</a:t>
+              <a:t>35</a:t>
             </a:fld>
             <a:endParaRPr lang="en-US"/>
           </a:p>
@@ -20447,7 +21145,7 @@
 </p:sld>
 </file>
 
-<file path=ppt/slides/slide38.xml><?xml version="1.0" encoding="utf-8"?>
+<file path=ppt/slides/slide36.xml><?xml version="1.0" encoding="utf-8"?>
 <p:sld xmlns:a="http://schemas.openxmlformats.org/drawingml/2006/main" xmlns:r="http://schemas.openxmlformats.org/officeDocument/2006/relationships" xmlns:p="http://schemas.openxmlformats.org/presentationml/2006/main">
   <p:cSld>
     <p:spTree>
@@ -20565,7 +21263,7 @@
           <a:p>
             <a:fld id="{20F37917-FD3A-4669-9018-DA04BCDD3D75}" type="slidenum">
               <a:rPr lang="en-US" smtClean="0"/>
-              <a:t>38</a:t>
+              <a:t>36</a:t>
             </a:fld>
             <a:endParaRPr lang="en-US"/>
           </a:p>
@@ -20584,7 +21282,7 @@
 </p:sld>
 </file>
 
-<file path=ppt/slides/slide39.xml><?xml version="1.0" encoding="utf-8"?>
+<file path=ppt/slides/slide37.xml><?xml version="1.0" encoding="utf-8"?>
 <p:sld xmlns:a="http://schemas.openxmlformats.org/drawingml/2006/main" xmlns:r="http://schemas.openxmlformats.org/officeDocument/2006/relationships" xmlns:p="http://schemas.openxmlformats.org/presentationml/2006/main">
   <p:cSld>
     <p:spTree>
@@ -20711,7 +21409,7 @@
           <a:p>
             <a:fld id="{20F37917-FD3A-4669-9018-DA04BCDD3D75}" type="slidenum">
               <a:rPr lang="en-US" smtClean="0"/>
-              <a:t>39</a:t>
+              <a:t>37</a:t>
             </a:fld>
             <a:endParaRPr lang="en-US"/>
           </a:p>
@@ -20957,6 +21655,313 @@
 </p:sld>
 </file>
 
+<file path=ppt/slides/slide38.xml><?xml version="1.0" encoding="utf-8"?>
+<p:sld xmlns:a="http://schemas.openxmlformats.org/drawingml/2006/main" xmlns:r="http://schemas.openxmlformats.org/officeDocument/2006/relationships" xmlns:p="http://schemas.openxmlformats.org/presentationml/2006/main">
+  <p:cSld>
+    <p:spTree>
+      <p:nvGrpSpPr>
+        <p:cNvPr id="1" name=""/>
+        <p:cNvGrpSpPr/>
+        <p:nvPr/>
+      </p:nvGrpSpPr>
+      <p:grpSpPr>
+        <a:xfrm>
+          <a:off x="0" y="0"/>
+          <a:ext cx="0" cy="0"/>
+          <a:chOff x="0" y="0"/>
+          <a:chExt cx="0" cy="0"/>
+        </a:xfrm>
+      </p:grpSpPr>
+      <p:sp>
+        <p:nvSpPr>
+          <p:cNvPr id="2" name="Title 1">
+            <a:extLst>
+              <a:ext uri="{FF2B5EF4-FFF2-40B4-BE49-F238E27FC236}">
+                <a16:creationId xmlns:a16="http://schemas.microsoft.com/office/drawing/2014/main" id="{992300D1-4FCF-7632-A87A-D563CA9E2118}"/>
+              </a:ext>
+            </a:extLst>
+          </p:cNvPr>
+          <p:cNvSpPr>
+            <a:spLocks noGrp="1"/>
+          </p:cNvSpPr>
+          <p:nvPr>
+            <p:ph type="title"/>
+          </p:nvPr>
+        </p:nvSpPr>
+        <p:spPr/>
+        <p:txBody>
+          <a:bodyPr/>
+          <a:lstStyle/>
+          <a:p>
+            <a:r>
+              <a:rPr lang="en-US" dirty="0"/>
+              <a:t>Stakeholder Analysis</a:t>
+            </a:r>
+          </a:p>
+        </p:txBody>
+      </p:sp>
+      <p:sp>
+        <p:nvSpPr>
+          <p:cNvPr id="3" name="Content Placeholder 2">
+            <a:extLst>
+              <a:ext uri="{FF2B5EF4-FFF2-40B4-BE49-F238E27FC236}">
+                <a16:creationId xmlns:a16="http://schemas.microsoft.com/office/drawing/2014/main" id="{9A961C99-2CC8-98AA-07DB-8A17C0B9AEF1}"/>
+              </a:ext>
+            </a:extLst>
+          </p:cNvPr>
+          <p:cNvSpPr>
+            <a:spLocks noGrp="1"/>
+          </p:cNvSpPr>
+          <p:nvPr>
+            <p:ph idx="1"/>
+          </p:nvPr>
+        </p:nvSpPr>
+        <p:spPr>
+          <a:xfrm>
+            <a:off x="838199" y="1500160"/>
+            <a:ext cx="10868247" cy="4351338"/>
+          </a:xfrm>
+        </p:spPr>
+        <p:txBody>
+          <a:bodyPr>
+            <a:normAutofit/>
+          </a:bodyPr>
+          <a:lstStyle/>
+          <a:p>
+            <a:pPr marL="514350" indent="-514350">
+              <a:buFont typeface="+mj-lt"/>
+              <a:buAutoNum type="arabicPeriod"/>
+            </a:pPr>
+            <a:r>
+              <a:rPr lang="en-US" dirty="0"/>
+              <a:t>Relative to the issue of content moderation, who or what are the stakeholders? (i.e. individuals or groups whose interests stand to be impacted by this algorithm?)</a:t>
+            </a:r>
+          </a:p>
+          <a:p>
+            <a:pPr marL="514350" indent="-514350">
+              <a:buFont typeface="+mj-lt"/>
+              <a:buAutoNum type="arabicPeriod"/>
+            </a:pPr>
+            <a:r>
+              <a:rPr lang="en-US" dirty="0"/>
+              <a:t>Relative to the issue of content moderation, what are the interests or values of the different stakeholders?</a:t>
+            </a:r>
+          </a:p>
+          <a:p>
+            <a:pPr marL="514350" indent="-514350">
+              <a:buFont typeface="+mj-lt"/>
+              <a:buAutoNum type="arabicPeriod"/>
+            </a:pPr>
+            <a:r>
+              <a:rPr lang="en-US" dirty="0"/>
+              <a:t>Are there any conflicts of interests or values?</a:t>
+            </a:r>
+          </a:p>
+          <a:p>
+            <a:pPr marL="514350" indent="-514350">
+              <a:buFont typeface="+mj-lt"/>
+              <a:buAutoNum type="arabicPeriod"/>
+            </a:pPr>
+            <a:r>
+              <a:rPr lang="en-US" dirty="0"/>
+              <a:t>Overall, given the different stakeholders, interests and values, do any of them stand out to you as ones we should prioritize? Why?</a:t>
+            </a:r>
+          </a:p>
+        </p:txBody>
+      </p:sp>
+      <p:sp>
+        <p:nvSpPr>
+          <p:cNvPr id="4" name="Slide Number Placeholder 3">
+            <a:extLst>
+              <a:ext uri="{FF2B5EF4-FFF2-40B4-BE49-F238E27FC236}">
+                <a16:creationId xmlns:a16="http://schemas.microsoft.com/office/drawing/2014/main" id="{B1846DD2-C733-7BF5-1A88-1DE2E1003009}"/>
+              </a:ext>
+            </a:extLst>
+          </p:cNvPr>
+          <p:cNvSpPr>
+            <a:spLocks noGrp="1"/>
+          </p:cNvSpPr>
+          <p:nvPr>
+            <p:ph type="sldNum" sz="quarter" idx="12"/>
+          </p:nvPr>
+        </p:nvSpPr>
+        <p:spPr/>
+        <p:txBody>
+          <a:bodyPr/>
+          <a:lstStyle/>
+          <a:p>
+            <a:fld id="{20F37917-FD3A-4669-9018-DA04BCDD3D75}" type="slidenum">
+              <a:rPr lang="en-US" smtClean="0"/>
+              <a:t>38</a:t>
+            </a:fld>
+            <a:endParaRPr lang="en-US"/>
+          </a:p>
+        </p:txBody>
+      </p:sp>
+    </p:spTree>
+    <p:extLst>
+      <p:ext uri="{BB962C8B-B14F-4D97-AF65-F5344CB8AC3E}">
+        <p14:creationId xmlns:p14="http://schemas.microsoft.com/office/powerpoint/2010/main" val="2492839813"/>
+      </p:ext>
+    </p:extLst>
+  </p:cSld>
+  <p:clrMapOvr>
+    <a:masterClrMapping/>
+  </p:clrMapOvr>
+</p:sld>
+</file>
+
+<file path=ppt/slides/slide39.xml><?xml version="1.0" encoding="utf-8"?>
+<p:sld xmlns:a="http://schemas.openxmlformats.org/drawingml/2006/main" xmlns:r="http://schemas.openxmlformats.org/officeDocument/2006/relationships" xmlns:p="http://schemas.openxmlformats.org/presentationml/2006/main">
+  <p:cSld>
+    <p:spTree>
+      <p:nvGrpSpPr>
+        <p:cNvPr id="1" name=""/>
+        <p:cNvGrpSpPr/>
+        <p:nvPr/>
+      </p:nvGrpSpPr>
+      <p:grpSpPr>
+        <a:xfrm>
+          <a:off x="0" y="0"/>
+          <a:ext cx="0" cy="0"/>
+          <a:chOff x="0" y="0"/>
+          <a:chExt cx="0" cy="0"/>
+        </a:xfrm>
+      </p:grpSpPr>
+      <p:sp>
+        <p:nvSpPr>
+          <p:cNvPr id="2" name="Title 1">
+            <a:extLst>
+              <a:ext uri="{FF2B5EF4-FFF2-40B4-BE49-F238E27FC236}">
+                <a16:creationId xmlns:a16="http://schemas.microsoft.com/office/drawing/2014/main" id="{335D756B-A2A8-E49D-275B-242F19E39A6F}"/>
+              </a:ext>
+            </a:extLst>
+          </p:cNvPr>
+          <p:cNvSpPr>
+            <a:spLocks noGrp="1"/>
+          </p:cNvSpPr>
+          <p:nvPr>
+            <p:ph type="title"/>
+          </p:nvPr>
+        </p:nvSpPr>
+        <p:spPr/>
+        <p:txBody>
+          <a:bodyPr/>
+          <a:lstStyle/>
+          <a:p>
+            <a:r>
+              <a:rPr lang="en-US" dirty="0"/>
+              <a:t>Value Investigations</a:t>
+            </a:r>
+          </a:p>
+        </p:txBody>
+      </p:sp>
+      <p:sp>
+        <p:nvSpPr>
+          <p:cNvPr id="3" name="Content Placeholder 2">
+            <a:extLst>
+              <a:ext uri="{FF2B5EF4-FFF2-40B4-BE49-F238E27FC236}">
+                <a16:creationId xmlns:a16="http://schemas.microsoft.com/office/drawing/2014/main" id="{2BBDF1D1-AD42-D3B3-32F6-3100087AE8EC}"/>
+              </a:ext>
+            </a:extLst>
+          </p:cNvPr>
+          <p:cNvSpPr>
+            <a:spLocks noGrp="1"/>
+          </p:cNvSpPr>
+          <p:nvPr>
+            <p:ph idx="1"/>
+          </p:nvPr>
+        </p:nvSpPr>
+        <p:spPr/>
+        <p:txBody>
+          <a:bodyPr>
+            <a:normAutofit lnSpcReduction="10000"/>
+          </a:bodyPr>
+          <a:lstStyle/>
+          <a:p>
+            <a:pPr marL="514350" indent="-514350">
+              <a:buFont typeface="+mj-lt"/>
+              <a:buAutoNum type="arabicPeriod"/>
+            </a:pPr>
+            <a:r>
+              <a:rPr lang="en-US" dirty="0"/>
+              <a:t>Why do you think some people might be concerned with Reddit removing user’s posts? What if the posts have misinformation or hate speech?</a:t>
+            </a:r>
+          </a:p>
+          <a:p>
+            <a:pPr marL="514350" indent="-514350">
+              <a:buFont typeface="+mj-lt"/>
+              <a:buAutoNum type="arabicPeriod"/>
+            </a:pPr>
+            <a:r>
+              <a:rPr lang="en-US" dirty="0"/>
+              <a:t>How are users harmed if posts are mistakenly removed by Reddit?</a:t>
+            </a:r>
+          </a:p>
+          <a:p>
+            <a:pPr marL="514350" indent="-514350">
+              <a:buFont typeface="+mj-lt"/>
+              <a:buAutoNum type="arabicPeriod"/>
+            </a:pPr>
+            <a:r>
+              <a:rPr lang="en-US" dirty="0"/>
+              <a:t>How can bias in the moderation algorithms potentially harm users?</a:t>
+            </a:r>
+          </a:p>
+          <a:p>
+            <a:pPr marL="514350" indent="-514350">
+              <a:buFont typeface="+mj-lt"/>
+              <a:buAutoNum type="arabicPeriod"/>
+            </a:pPr>
+            <a:r>
+              <a:rPr lang="en-US" dirty="0"/>
+              <a:t>Given the debate on free speech vs. content moderation what do you think are the strengths and weaknesses of the proposed requirement?</a:t>
+            </a:r>
+          </a:p>
+        </p:txBody>
+      </p:sp>
+      <p:sp>
+        <p:nvSpPr>
+          <p:cNvPr id="4" name="Slide Number Placeholder 3">
+            <a:extLst>
+              <a:ext uri="{FF2B5EF4-FFF2-40B4-BE49-F238E27FC236}">
+                <a16:creationId xmlns:a16="http://schemas.microsoft.com/office/drawing/2014/main" id="{D4A73DC0-62D3-455A-A1DF-7F2AFE5098A9}"/>
+              </a:ext>
+            </a:extLst>
+          </p:cNvPr>
+          <p:cNvSpPr>
+            <a:spLocks noGrp="1"/>
+          </p:cNvSpPr>
+          <p:nvPr>
+            <p:ph type="sldNum" sz="quarter" idx="12"/>
+          </p:nvPr>
+        </p:nvSpPr>
+        <p:spPr/>
+        <p:txBody>
+          <a:bodyPr/>
+          <a:lstStyle/>
+          <a:p>
+            <a:fld id="{20F37917-FD3A-4669-9018-DA04BCDD3D75}" type="slidenum">
+              <a:rPr lang="en-US" smtClean="0"/>
+              <a:t>39</a:t>
+            </a:fld>
+            <a:endParaRPr lang="en-US"/>
+          </a:p>
+        </p:txBody>
+      </p:sp>
+    </p:spTree>
+    <p:extLst>
+      <p:ext uri="{BB962C8B-B14F-4D97-AF65-F5344CB8AC3E}">
+        <p14:creationId xmlns:p14="http://schemas.microsoft.com/office/powerpoint/2010/main" val="1519777456"/>
+      </p:ext>
+    </p:extLst>
+  </p:cSld>
+  <p:clrMapOvr>
+    <a:masterClrMapping/>
+  </p:clrMapOvr>
+</p:sld>
+</file>
+
 <file path=ppt/slides/slide4.xml><?xml version="1.0" encoding="utf-8"?>
 <p:sld xmlns:a="http://schemas.openxmlformats.org/drawingml/2006/main" xmlns:r="http://schemas.openxmlformats.org/officeDocument/2006/relationships" xmlns:p="http://schemas.openxmlformats.org/presentationml/2006/main">
   <p:cSld>
@@ -21234,7 +22239,7 @@
           <p:cNvPr id="2" name="Title 1">
             <a:extLst>
               <a:ext uri="{FF2B5EF4-FFF2-40B4-BE49-F238E27FC236}">
-                <a16:creationId xmlns:a16="http://schemas.microsoft.com/office/drawing/2014/main" id="{992300D1-4FCF-7632-A87A-D563CA9E2118}"/>
+                <a16:creationId xmlns:a16="http://schemas.microsoft.com/office/drawing/2014/main" id="{3D677602-B4CF-BDC8-DDE2-14B6FB2174BF}"/>
               </a:ext>
             </a:extLst>
           </p:cNvPr>
@@ -21252,7 +22257,7 @@
           <a:p>
             <a:r>
               <a:rPr lang="en-US" dirty="0"/>
-              <a:t>Stakeholder Analysis</a:t>
+              <a:t>Technical Investigations</a:t>
             </a:r>
           </a:p>
         </p:txBody>
@@ -21262,7 +22267,7 @@
           <p:cNvPr id="3" name="Content Placeholder 2">
             <a:extLst>
               <a:ext uri="{FF2B5EF4-FFF2-40B4-BE49-F238E27FC236}">
-                <a16:creationId xmlns:a16="http://schemas.microsoft.com/office/drawing/2014/main" id="{9A961C99-2CC8-98AA-07DB-8A17C0B9AEF1}"/>
+                <a16:creationId xmlns:a16="http://schemas.microsoft.com/office/drawing/2014/main" id="{C36CF53C-4066-4127-A0C2-13EAEDBD150D}"/>
               </a:ext>
             </a:extLst>
           </p:cNvPr>
@@ -21273,39 +22278,40 @@
             <p:ph idx="1"/>
           </p:nvPr>
         </p:nvSpPr>
-        <p:spPr>
-          <a:xfrm>
-            <a:off x="838199" y="1500160"/>
-            <a:ext cx="10868247" cy="4351338"/>
-          </a:xfrm>
-        </p:spPr>
+        <p:spPr/>
         <p:txBody>
-          <a:bodyPr>
-            <a:normAutofit/>
-          </a:bodyPr>
+          <a:bodyPr/>
           <a:lstStyle/>
           <a:p>
             <a:r>
               <a:rPr lang="en-US" dirty="0"/>
-              <a:t>Relative to the issue of content moderation, who or what are the stakeholders? (i.e. individuals or groups whose interests stand to be impacted by this algorithm?)</a:t>
-            </a:r>
-          </a:p>
-          <a:p>
-            <a:r>
-              <a:rPr lang="en-US" dirty="0"/>
-              <a:t>Relative to the issue of content moderation, what are the interests or values of the different stakeholders?</a:t>
-            </a:r>
-          </a:p>
-          <a:p>
-            <a:r>
-              <a:rPr lang="en-US" dirty="0"/>
-              <a:t>Are there any conflicts of interests or values?</a:t>
-            </a:r>
-          </a:p>
-          <a:p>
-            <a:r>
-              <a:rPr lang="en-US" dirty="0"/>
-              <a:t>Overall, given the different stakeholders, interests and values, do any of them stand out to you as ones we should prioritize? Why?</a:t>
+              <a:t>Suppose as a result of the VSD analysis we came up with two high-level requirements:</a:t>
+            </a:r>
+          </a:p>
+          <a:p>
+            <a:pPr marL="914400" lvl="1" indent="-457200">
+              <a:buFont typeface="+mj-lt"/>
+              <a:buAutoNum type="arabicPeriod"/>
+            </a:pPr>
+            <a:r>
+              <a:rPr lang="en-US" dirty="0"/>
+              <a:t>The flagging feature gives an explanation to the user as to why the system flagged and removed their content. If, after reading the explanation, the user thought the flagging was in error, they can submit the flag for further review. </a:t>
+            </a:r>
+          </a:p>
+          <a:p>
+            <a:pPr marL="914400" lvl="1" indent="-457200">
+              <a:buFont typeface="+mj-lt"/>
+              <a:buAutoNum type="arabicPeriod"/>
+            </a:pPr>
+            <a:r>
+              <a:rPr lang="en-US" dirty="0"/>
+              <a:t>The system prompts the user to reconsider (does not prevent) if their post is potentially offensive.</a:t>
+            </a:r>
+          </a:p>
+          <a:p>
+            <a:r>
+              <a:rPr lang="en-US" dirty="0"/>
+              <a:t>Which requirement would you prefer and why in terms of the values you think are important to you?</a:t>
             </a:r>
           </a:p>
         </p:txBody>
@@ -21315,7 +22321,7 @@
           <p:cNvPr id="4" name="Slide Number Placeholder 3">
             <a:extLst>
               <a:ext uri="{FF2B5EF4-FFF2-40B4-BE49-F238E27FC236}">
-                <a16:creationId xmlns:a16="http://schemas.microsoft.com/office/drawing/2014/main" id="{B1846DD2-C733-7BF5-1A88-1DE2E1003009}"/>
+                <a16:creationId xmlns:a16="http://schemas.microsoft.com/office/drawing/2014/main" id="{32FCEC0B-BB53-CE83-F74E-D021035F50E0}"/>
               </a:ext>
             </a:extLst>
           </p:cNvPr>
@@ -21342,7 +22348,7 @@
     </p:spTree>
     <p:extLst>
       <p:ext uri="{BB962C8B-B14F-4D97-AF65-F5344CB8AC3E}">
-        <p14:creationId xmlns:p14="http://schemas.microsoft.com/office/powerpoint/2010/main" val="2492839813"/>
+        <p14:creationId xmlns:p14="http://schemas.microsoft.com/office/powerpoint/2010/main" val="1904462745"/>
       </p:ext>
     </p:extLst>
   </p:cSld>
@@ -21374,7 +22380,7 @@
           <p:cNvPr id="2" name="Title 1">
             <a:extLst>
               <a:ext uri="{FF2B5EF4-FFF2-40B4-BE49-F238E27FC236}">
-                <a16:creationId xmlns:a16="http://schemas.microsoft.com/office/drawing/2014/main" id="{335D756B-A2A8-E49D-275B-242F19E39A6F}"/>
+                <a16:creationId xmlns:a16="http://schemas.microsoft.com/office/drawing/2014/main" id="{1ADD271A-4170-C5F2-C69E-66357770CC1B}"/>
               </a:ext>
             </a:extLst>
           </p:cNvPr>
@@ -21392,7 +22398,7 @@
           <a:p>
             <a:r>
               <a:rPr lang="en-US" dirty="0"/>
-              <a:t>Value Investigations</a:t>
+              <a:t>VSD and User Stories</a:t>
             </a:r>
           </a:p>
         </p:txBody>
@@ -21402,7 +22408,7 @@
           <p:cNvPr id="3" name="Content Placeholder 2">
             <a:extLst>
               <a:ext uri="{FF2B5EF4-FFF2-40B4-BE49-F238E27FC236}">
-                <a16:creationId xmlns:a16="http://schemas.microsoft.com/office/drawing/2014/main" id="{2BBDF1D1-AD42-D3B3-32F6-3100087AE8EC}"/>
+                <a16:creationId xmlns:a16="http://schemas.microsoft.com/office/drawing/2014/main" id="{07D4A9E1-54C4-62AE-1AB7-CC939291C0B9}"/>
               </a:ext>
             </a:extLst>
           </p:cNvPr>
@@ -21415,32 +22421,46 @@
         </p:nvSpPr>
         <p:spPr/>
         <p:txBody>
-          <a:bodyPr>
-            <a:normAutofit/>
-          </a:bodyPr>
+          <a:bodyPr/>
           <a:lstStyle/>
           <a:p>
             <a:r>
               <a:rPr lang="en-US" dirty="0"/>
-              <a:t>Why do you think some people might be concerned with Reddit removing user’s posts? What if the posts have misinformation?</a:t>
-            </a:r>
-          </a:p>
-          <a:p>
-            <a:r>
-              <a:rPr lang="en-US" dirty="0"/>
-              <a:t>How are users harmed if posts are mistakenly removed by Reddit?</a:t>
-            </a:r>
-          </a:p>
-          <a:p>
-            <a:r>
-              <a:rPr lang="en-US" dirty="0"/>
-              <a:t>How can bias in the moderation algorithms potentially harm users?</a:t>
-            </a:r>
-          </a:p>
-          <a:p>
-            <a:r>
-              <a:rPr lang="en-US" dirty="0"/>
-              <a:t>Given the debate on free speech vs. content moderation what do you think are the strengths and weaknesses of the proposed requirement?</a:t>
+              <a:t>Formally specify the chosen requirement as user stories.</a:t>
+            </a:r>
+          </a:p>
+          <a:p>
+            <a:r>
+              <a:rPr lang="en-US" dirty="0"/>
+              <a:t>Your user stories must capture the following:</a:t>
+            </a:r>
+          </a:p>
+          <a:p>
+            <a:pPr lvl="1"/>
+            <a:r>
+              <a:rPr lang="en-US" dirty="0"/>
+              <a:t>Who are the stakeholders?</a:t>
+            </a:r>
+          </a:p>
+          <a:p>
+            <a:pPr lvl="1"/>
+            <a:r>
+              <a:rPr lang="en-US" dirty="0"/>
+              <a:t>What are the values?</a:t>
+            </a:r>
+          </a:p>
+          <a:p>
+            <a:pPr lvl="1"/>
+            <a:r>
+              <a:rPr lang="en-US" dirty="0"/>
+              <a:t>What value tensions were resolved?</a:t>
+            </a:r>
+          </a:p>
+          <a:p>
+            <a:pPr lvl="1"/>
+            <a:r>
+              <a:rPr lang="en-US" dirty="0"/>
+              <a:t>What are the conditions of satisfaction?</a:t>
             </a:r>
           </a:p>
         </p:txBody>
@@ -21450,7 +22470,7 @@
           <p:cNvPr id="4" name="Slide Number Placeholder 3">
             <a:extLst>
               <a:ext uri="{FF2B5EF4-FFF2-40B4-BE49-F238E27FC236}">
-                <a16:creationId xmlns:a16="http://schemas.microsoft.com/office/drawing/2014/main" id="{D4A73DC0-62D3-455A-A1DF-7F2AFE5098A9}"/>
+                <a16:creationId xmlns:a16="http://schemas.microsoft.com/office/drawing/2014/main" id="{37E7A858-98E7-6833-17AC-6377EA96A2A3}"/>
               </a:ext>
             </a:extLst>
           </p:cNvPr>
@@ -21477,7 +22497,7 @@
     </p:spTree>
     <p:extLst>
       <p:ext uri="{BB962C8B-B14F-4D97-AF65-F5344CB8AC3E}">
-        <p14:creationId xmlns:p14="http://schemas.microsoft.com/office/powerpoint/2010/main" val="1519777456"/>
+        <p14:creationId xmlns:p14="http://schemas.microsoft.com/office/powerpoint/2010/main" val="3677923322"/>
       </p:ext>
     </p:extLst>
   </p:cSld>
@@ -21509,7 +22529,7 @@
           <p:cNvPr id="2" name="Title 1">
             <a:extLst>
               <a:ext uri="{FF2B5EF4-FFF2-40B4-BE49-F238E27FC236}">
-                <a16:creationId xmlns:a16="http://schemas.microsoft.com/office/drawing/2014/main" id="{3D677602-B4CF-BDC8-DDE2-14B6FB2174BF}"/>
+                <a16:creationId xmlns:a16="http://schemas.microsoft.com/office/drawing/2014/main" id="{E743D407-5B53-49A7-9907-E801EA7FFD8E}"/>
               </a:ext>
             </a:extLst>
           </p:cNvPr>
@@ -21527,7 +22547,7 @@
           <a:p>
             <a:r>
               <a:rPr lang="en-US" dirty="0"/>
-              <a:t>Technical Investigations</a:t>
+              <a:t>Learning Goals for this Lesson</a:t>
             </a:r>
           </a:p>
         </p:txBody>
@@ -21537,7 +22557,7 @@
           <p:cNvPr id="3" name="Content Placeholder 2">
             <a:extLst>
               <a:ext uri="{FF2B5EF4-FFF2-40B4-BE49-F238E27FC236}">
-                <a16:creationId xmlns:a16="http://schemas.microsoft.com/office/drawing/2014/main" id="{C36CF53C-4066-4127-A0C2-13EAEDBD150D}"/>
+                <a16:creationId xmlns:a16="http://schemas.microsoft.com/office/drawing/2014/main" id="{AC300E2B-BFD0-4090-AFC5-FE82683F997F}"/>
               </a:ext>
             </a:extLst>
           </p:cNvPr>
@@ -21548,40 +22568,54 @@
             <p:ph idx="1"/>
           </p:nvPr>
         </p:nvSpPr>
-        <p:spPr/>
+        <p:spPr>
+          <a:xfrm>
+            <a:off x="838199" y="1500160"/>
+            <a:ext cx="10515599" cy="4351338"/>
+          </a:xfrm>
+        </p:spPr>
         <p:txBody>
           <a:bodyPr/>
           <a:lstStyle/>
           <a:p>
             <a:r>
               <a:rPr lang="en-US" dirty="0"/>
-              <a:t>Suppose as a result of the VSD analysis we came up with two high-level requirements:</a:t>
-            </a:r>
-          </a:p>
-          <a:p>
-            <a:pPr marL="914400" lvl="1" indent="-457200">
-              <a:buFont typeface="+mj-lt"/>
-              <a:buAutoNum type="arabicPeriod"/>
-            </a:pPr>
-            <a:r>
-              <a:rPr lang="en-US" dirty="0"/>
-              <a:t>The flagging feature gives an explanation to the user as to why the system flagged and removed their content. If, after reading the explanation, the user thought the flagging was in error, they can submit the flag for further review. </a:t>
-            </a:r>
-          </a:p>
-          <a:p>
-            <a:pPr marL="914400" lvl="1" indent="-457200">
-              <a:buFont typeface="+mj-lt"/>
-              <a:buAutoNum type="arabicPeriod"/>
-            </a:pPr>
-            <a:r>
-              <a:rPr lang="en-US" dirty="0"/>
-              <a:t>The system prompts the user to reconsider (does not prevent) if their post is potentially offensive.</a:t>
-            </a:r>
-          </a:p>
-          <a:p>
-            <a:r>
-              <a:rPr lang="en-US" dirty="0"/>
-              <a:t>Which requirement would you prefer and why in terms of the values you think are important to you?</a:t>
+              <a:t>At the end of this lesson, you should be able to</a:t>
+            </a:r>
+          </a:p>
+          <a:p>
+            <a:pPr lvl="1"/>
+            <a:r>
+              <a:rPr lang="en-US" dirty="0"/>
+              <a:t>Explain the overall purposes of requirements analysis</a:t>
+            </a:r>
+          </a:p>
+          <a:p>
+            <a:pPr lvl="1"/>
+            <a:r>
+              <a:rPr lang="en-US" dirty="0"/>
+              <a:t>Enumerate and explain 3 major dimensions of risk in Requirements Analysis</a:t>
+            </a:r>
+          </a:p>
+          <a:p>
+            <a:pPr lvl="1"/>
+            <a:r>
+              <a:rPr lang="en-US" dirty="0"/>
+              <a:t>Explain the difference between functional and non-functional requirements, and give examples of each  </a:t>
+            </a:r>
+          </a:p>
+          <a:p>
+            <a:pPr lvl="1"/>
+            <a:r>
+              <a:rPr lang="en-US" dirty="0"/>
+              <a:t>Define the notions of user stories and conditions of satisfaction, and give multiple examples</a:t>
+            </a:r>
+          </a:p>
+          <a:p>
+            <a:pPr lvl="1"/>
+            <a:r>
+              <a:rPr lang="en-US" dirty="0"/>
+              <a:t>Use Value Sensitive Design to uncover requirements based on stakeholder analysis and value investigations.</a:t>
             </a:r>
           </a:p>
         </p:txBody>
@@ -21591,7 +22625,7 @@
           <p:cNvPr id="4" name="Slide Number Placeholder 3">
             <a:extLst>
               <a:ext uri="{FF2B5EF4-FFF2-40B4-BE49-F238E27FC236}">
-                <a16:creationId xmlns:a16="http://schemas.microsoft.com/office/drawing/2014/main" id="{32FCEC0B-BB53-CE83-F74E-D021035F50E0}"/>
+                <a16:creationId xmlns:a16="http://schemas.microsoft.com/office/drawing/2014/main" id="{B7BF3F82-6F96-41E0-9C15-23CE00076176}"/>
               </a:ext>
             </a:extLst>
           </p:cNvPr>
@@ -21618,156 +22652,7 @@
     </p:spTree>
     <p:extLst>
       <p:ext uri="{BB962C8B-B14F-4D97-AF65-F5344CB8AC3E}">
-        <p14:creationId xmlns:p14="http://schemas.microsoft.com/office/powerpoint/2010/main" val="1904462745"/>
-      </p:ext>
-    </p:extLst>
-  </p:cSld>
-  <p:clrMapOvr>
-    <a:masterClrMapping/>
-  </p:clrMapOvr>
-</p:sld>
-</file>
-
-<file path=ppt/slides/slide43.xml><?xml version="1.0" encoding="utf-8"?>
-<p:sld xmlns:a="http://schemas.openxmlformats.org/drawingml/2006/main" xmlns:r="http://schemas.openxmlformats.org/officeDocument/2006/relationships" xmlns:p="http://schemas.openxmlformats.org/presentationml/2006/main">
-  <p:cSld>
-    <p:spTree>
-      <p:nvGrpSpPr>
-        <p:cNvPr id="1" name=""/>
-        <p:cNvGrpSpPr/>
-        <p:nvPr/>
-      </p:nvGrpSpPr>
-      <p:grpSpPr>
-        <a:xfrm>
-          <a:off x="0" y="0"/>
-          <a:ext cx="0" cy="0"/>
-          <a:chOff x="0" y="0"/>
-          <a:chExt cx="0" cy="0"/>
-        </a:xfrm>
-      </p:grpSpPr>
-      <p:sp>
-        <p:nvSpPr>
-          <p:cNvPr id="2" name="Title 1">
-            <a:extLst>
-              <a:ext uri="{FF2B5EF4-FFF2-40B4-BE49-F238E27FC236}">
-                <a16:creationId xmlns:a16="http://schemas.microsoft.com/office/drawing/2014/main" id="{1ADD271A-4170-C5F2-C69E-66357770CC1B}"/>
-              </a:ext>
-            </a:extLst>
-          </p:cNvPr>
-          <p:cNvSpPr>
-            <a:spLocks noGrp="1"/>
-          </p:cNvSpPr>
-          <p:nvPr>
-            <p:ph type="title"/>
-          </p:nvPr>
-        </p:nvSpPr>
-        <p:spPr/>
-        <p:txBody>
-          <a:bodyPr/>
-          <a:lstStyle/>
-          <a:p>
-            <a:r>
-              <a:rPr lang="en-US" dirty="0"/>
-              <a:t>VSD and User Stories</a:t>
-            </a:r>
-          </a:p>
-        </p:txBody>
-      </p:sp>
-      <p:sp>
-        <p:nvSpPr>
-          <p:cNvPr id="3" name="Content Placeholder 2">
-            <a:extLst>
-              <a:ext uri="{FF2B5EF4-FFF2-40B4-BE49-F238E27FC236}">
-                <a16:creationId xmlns:a16="http://schemas.microsoft.com/office/drawing/2014/main" id="{07D4A9E1-54C4-62AE-1AB7-CC939291C0B9}"/>
-              </a:ext>
-            </a:extLst>
-          </p:cNvPr>
-          <p:cNvSpPr>
-            <a:spLocks noGrp="1"/>
-          </p:cNvSpPr>
-          <p:nvPr>
-            <p:ph idx="1"/>
-          </p:nvPr>
-        </p:nvSpPr>
-        <p:spPr/>
-        <p:txBody>
-          <a:bodyPr/>
-          <a:lstStyle/>
-          <a:p>
-            <a:r>
-              <a:rPr lang="en-US" dirty="0"/>
-              <a:t>Formally specify the chosen requirement as user stories.</a:t>
-            </a:r>
-          </a:p>
-          <a:p>
-            <a:r>
-              <a:rPr lang="en-US" dirty="0"/>
-              <a:t>Your user stories must capture the following:</a:t>
-            </a:r>
-          </a:p>
-          <a:p>
-            <a:pPr lvl="1"/>
-            <a:r>
-              <a:rPr lang="en-US" dirty="0"/>
-              <a:t>Who are the stakeholders?</a:t>
-            </a:r>
-          </a:p>
-          <a:p>
-            <a:pPr lvl="1"/>
-            <a:r>
-              <a:rPr lang="en-US" dirty="0"/>
-              <a:t>What are the values?</a:t>
-            </a:r>
-          </a:p>
-          <a:p>
-            <a:pPr lvl="1"/>
-            <a:r>
-              <a:rPr lang="en-US" dirty="0"/>
-              <a:t>What value tensions were resolved?</a:t>
-            </a:r>
-          </a:p>
-          <a:p>
-            <a:pPr lvl="1"/>
-            <a:r>
-              <a:rPr lang="en-US" dirty="0"/>
-              <a:t>What are the conditions of satisfaction?</a:t>
-            </a:r>
-          </a:p>
-        </p:txBody>
-      </p:sp>
-      <p:sp>
-        <p:nvSpPr>
-          <p:cNvPr id="4" name="Slide Number Placeholder 3">
-            <a:extLst>
-              <a:ext uri="{FF2B5EF4-FFF2-40B4-BE49-F238E27FC236}">
-                <a16:creationId xmlns:a16="http://schemas.microsoft.com/office/drawing/2014/main" id="{37E7A858-98E7-6833-17AC-6377EA96A2A3}"/>
-              </a:ext>
-            </a:extLst>
-          </p:cNvPr>
-          <p:cNvSpPr>
-            <a:spLocks noGrp="1"/>
-          </p:cNvSpPr>
-          <p:nvPr>
-            <p:ph type="sldNum" sz="quarter" idx="12"/>
-          </p:nvPr>
-        </p:nvSpPr>
-        <p:spPr/>
-        <p:txBody>
-          <a:bodyPr/>
-          <a:lstStyle/>
-          <a:p>
-            <a:fld id="{20F37917-FD3A-4669-9018-DA04BCDD3D75}" type="slidenum">
-              <a:rPr lang="en-US" smtClean="0"/>
-              <a:t>43</a:t>
-            </a:fld>
-            <a:endParaRPr lang="en-US"/>
-          </a:p>
-        </p:txBody>
-      </p:sp>
-    </p:spTree>
-    <p:extLst>
-      <p:ext uri="{BB962C8B-B14F-4D97-AF65-F5344CB8AC3E}">
-        <p14:creationId xmlns:p14="http://schemas.microsoft.com/office/powerpoint/2010/main" val="3677923322"/>
+        <p14:creationId xmlns:p14="http://schemas.microsoft.com/office/powerpoint/2010/main" val="673410589"/>
       </p:ext>
     </p:extLst>
   </p:cSld>

</xml_diff>

<commit_message>
updated slide 32 of m1.2
</commit_message>
<xml_diff>
--- a/Slides/Module 01.2 Requirements Gathering.pptx
+++ b/Slides/Module 01.2 Requirements Gathering.pptx
@@ -2319,8 +2319,8 @@
     <dgm:cxn modelId="{0D619939-DF3D-4D20-BB53-412AF78EA558}" type="presOf" srcId="{ABB0E679-4682-422A-B4B3-34D44CC4C90C}" destId="{BBEC7333-A5CB-4B43-A34A-870E516E4DD6}" srcOrd="0" destOrd="0" presId="urn:microsoft.com/office/officeart/2018/2/layout/IconVerticalSolidList"/>
     <dgm:cxn modelId="{07AC9C4A-377E-4379-B550-8DB49E3862F9}" srcId="{ABB0E679-4682-422A-B4B3-34D44CC4C90C}" destId="{8859CDF6-BBF5-4A76-8A76-407071531CB6}" srcOrd="2" destOrd="0" parTransId="{4553293F-765F-468C-A52D-17712ED16F1F}" sibTransId="{CD3D3010-EDC9-481C-A822-9AFA251D0BAD}"/>
     <dgm:cxn modelId="{F7C5F74B-BB11-4F28-9F7E-23FE778011DC}" type="presOf" srcId="{79B77230-D940-49CC-AF47-BF1D40797D89}" destId="{D527155E-0657-496B-926B-6BBC0B628D07}" srcOrd="0" destOrd="0" presId="urn:microsoft.com/office/officeart/2018/2/layout/IconVerticalSolidList"/>
+    <dgm:cxn modelId="{BBA2886E-1FC2-4FFE-BF42-BABB70DB9D54}" srcId="{ABB0E679-4682-422A-B4B3-34D44CC4C90C}" destId="{79B77230-D940-49CC-AF47-BF1D40797D89}" srcOrd="0" destOrd="0" parTransId="{C50558CC-69DA-4C28-8CB9-2982E9088524}" sibTransId="{01A261DD-4242-4987-8459-53BA826F65E4}"/>
     <dgm:cxn modelId="{16B49D51-0857-4A44-AD1A-0C1006418460}" srcId="{7851135E-E593-49EB-9C66-FB8F80DCC8EB}" destId="{0F25331F-8FB8-4E3A-87F2-3F285D74EB32}" srcOrd="2" destOrd="0" parTransId="{324E124D-8500-4C04-A0BA-6F6C2D553D81}" sibTransId="{4716CEE8-C882-4DFA-8AAE-CB3797F9F69F}"/>
-    <dgm:cxn modelId="{BBA2886E-1FC2-4FFE-BF42-BABB70DB9D54}" srcId="{ABB0E679-4682-422A-B4B3-34D44CC4C90C}" destId="{79B77230-D940-49CC-AF47-BF1D40797D89}" srcOrd="0" destOrd="0" parTransId="{C50558CC-69DA-4C28-8CB9-2982E9088524}" sibTransId="{01A261DD-4242-4987-8459-53BA826F65E4}"/>
     <dgm:cxn modelId="{6F534F79-49C3-49F2-B767-CA8451407698}" type="presOf" srcId="{2CC7D121-8A41-44D9-89BD-244AA28A42A0}" destId="{D527155E-0657-496B-926B-6BBC0B628D07}" srcOrd="0" destOrd="1" presId="urn:microsoft.com/office/officeart/2018/2/layout/IconVerticalSolidList"/>
     <dgm:cxn modelId="{83B9F09E-EAE2-4CC8-ADD5-C1D9758C0071}" type="presOf" srcId="{A898EC3E-4F02-462D-8397-BC48F29AE81B}" destId="{4FB2F518-2BF4-4FD7-A56E-47F3A3918E17}" srcOrd="0" destOrd="0" presId="urn:microsoft.com/office/officeart/2018/2/layout/IconVerticalSolidList"/>
     <dgm:cxn modelId="{D9C411B4-474A-4FB0-9E9B-1E92A378E566}" srcId="{289B9B18-ED8C-4F8C-B57D-E359AFC29DCD}" destId="{A898EC3E-4F02-462D-8397-BC48F29AE81B}" srcOrd="0" destOrd="0" parTransId="{AD9DCD49-7708-4181-B664-3E4D3C91E37D}" sibTransId="{5F251CD8-B93E-4310-9598-EB0F0D698564}"/>
@@ -6135,7 +6135,7 @@
           <a:p>
             <a:fld id="{7C7E5181-6CF5-45F7-A87A-E0E0B1FD7549}" type="datetimeFigureOut">
               <a:rPr lang="en-US" smtClean="0"/>
-              <a:t>6/25/25</a:t>
+              <a:t>7/2/2025</a:t>
             </a:fld>
             <a:endParaRPr lang="en-US"/>
           </a:p>
@@ -10381,7 +10381,7 @@
           <a:p>
             <a:fld id="{5D2A64DE-480B-420F-9649-4F8E696E08E0}" type="datetime1">
               <a:rPr lang="en-US" smtClean="0"/>
-              <a:t>6/25/25</a:t>
+              <a:t>7/2/2025</a:t>
             </a:fld>
             <a:endParaRPr lang="en-US"/>
           </a:p>
@@ -10705,7 +10705,7 @@
           <a:p>
             <a:fld id="{EA476A42-A091-4468-A075-64A31BE59948}" type="datetime1">
               <a:rPr lang="en-US" smtClean="0"/>
-              <a:t>6/25/25</a:t>
+              <a:t>7/2/2025</a:t>
             </a:fld>
             <a:endParaRPr lang="en-US"/>
           </a:p>
@@ -10903,7 +10903,7 @@
           <a:p>
             <a:fld id="{0D3616D0-8311-4107-9726-6B805E7D05BA}" type="datetime1">
               <a:rPr lang="en-US" smtClean="0"/>
-              <a:t>6/25/25</a:t>
+              <a:t>7/2/2025</a:t>
             </a:fld>
             <a:endParaRPr lang="en-US"/>
           </a:p>
@@ -11111,7 +11111,7 @@
           <a:p>
             <a:fld id="{3BC2557A-5C88-417A-A763-5AC779462A5F}" type="datetime1">
               <a:rPr lang="en-US" smtClean="0"/>
-              <a:t>6/25/25</a:t>
+              <a:t>7/2/2025</a:t>
             </a:fld>
             <a:endParaRPr lang="en-US"/>
           </a:p>
@@ -11635,7 +11635,7 @@
           <a:p>
             <a:fld id="{07C7BFD4-467E-4EDE-93EA-052F5B39A4E5}" type="datetime1">
               <a:rPr lang="en-US" smtClean="0"/>
-              <a:t>6/25/25</a:t>
+              <a:t>7/2/2025</a:t>
             </a:fld>
             <a:endParaRPr lang="en-US"/>
           </a:p>
@@ -11885,7 +11885,7 @@
           <a:p>
             <a:fld id="{07C7BFD4-467E-4EDE-93EA-052F5B39A4E5}" type="datetime1">
               <a:rPr lang="en-US" smtClean="0"/>
-              <a:t>6/25/25</a:t>
+              <a:t>7/2/2025</a:t>
             </a:fld>
             <a:endParaRPr lang="en-US"/>
           </a:p>
@@ -12067,7 +12067,7 @@
           <a:p>
             <a:fld id="{109E55A0-C911-4F03-82FC-7E5926047D46}" type="datetime1">
               <a:rPr lang="en-US" smtClean="0"/>
-              <a:t>6/25/25</a:t>
+              <a:t>7/2/2025</a:t>
             </a:fld>
             <a:endParaRPr lang="en-US"/>
           </a:p>
@@ -12380,7 +12380,7 @@
           <a:p>
             <a:fld id="{A533CBE2-D5BE-47AC-ADC2-9CDFC1D0CF90}" type="datetime1">
               <a:rPr lang="en-US" smtClean="0"/>
-              <a:t>6/25/25</a:t>
+              <a:t>7/2/2025</a:t>
             </a:fld>
             <a:endParaRPr lang="en-US"/>
           </a:p>
@@ -12681,7 +12681,7 @@
           <a:p>
             <a:fld id="{39B7EDB1-CE74-4951-85A2-0B01C2128E28}" type="datetime1">
               <a:rPr lang="en-US" smtClean="0"/>
-              <a:t>6/25/25</a:t>
+              <a:t>7/2/2025</a:t>
             </a:fld>
             <a:endParaRPr lang="en-US"/>
           </a:p>
@@ -13129,7 +13129,7 @@
           <a:p>
             <a:fld id="{2BC7EB92-A5C2-4807-A9DC-9EDE6CBFB241}" type="datetime1">
               <a:rPr lang="en-US" smtClean="0"/>
-              <a:t>6/25/25</a:t>
+              <a:t>7/2/2025</a:t>
             </a:fld>
             <a:endParaRPr lang="en-US"/>
           </a:p>
@@ -13242,7 +13242,7 @@
           <a:p>
             <a:fld id="{2B7B7EE0-7771-4CD5-9B2B-3550753A54A1}" type="datetime1">
               <a:rPr lang="en-US" smtClean="0"/>
-              <a:t>6/25/25</a:t>
+              <a:t>7/2/2025</a:t>
             </a:fld>
             <a:endParaRPr lang="en-US"/>
           </a:p>
@@ -13553,7 +13553,7 @@
           <a:p>
             <a:fld id="{F8B318B3-0E87-4416-A9B8-D891968C2727}" type="datetime1">
               <a:rPr lang="en-US" smtClean="0"/>
-              <a:t>6/25/25</a:t>
+              <a:t>7/2/2025</a:t>
             </a:fld>
             <a:endParaRPr lang="en-US"/>
           </a:p>
@@ -13794,7 +13794,7 @@
           <a:p>
             <a:fld id="{54D997E8-DDEE-43F1-8D9B-F8A1E11DE488}" type="datetime1">
               <a:rPr lang="en-US" smtClean="0"/>
-              <a:t>6/25/25</a:t>
+              <a:t>7/2/2025</a:t>
             </a:fld>
             <a:endParaRPr lang="en-US"/>
           </a:p>
@@ -15443,7 +15443,7 @@
             <a:pPr lvl="1"/>
             <a:r>
               <a:rPr lang="en-US" dirty="0"/>
-              <a:t>Extra features (desirable and optional features): 50 points</a:t>
+              <a:t>Extra features (desirable and/or optional features): 50 points</a:t>
             </a:r>
           </a:p>
           <a:p>
@@ -18453,8 +18453,22 @@
           </a:xfrm>
         </p:spPr>
         <p:txBody>
-          <a:bodyPr/>
+          <a:bodyPr>
+            <a:normAutofit lnSpcReduction="10000"/>
+          </a:bodyPr>
           <a:lstStyle/>
+          <a:p>
+            <a:r>
+              <a:rPr lang="en-US" dirty="0"/>
+              <a:t>As developers, we often spend most of our time and effort on features (i.e., functional requirements).</a:t>
+            </a:r>
+          </a:p>
+          <a:p>
+            <a:r>
+              <a:rPr lang="en-US" dirty="0"/>
+              <a:t>But there is more ….</a:t>
+            </a:r>
+          </a:p>
           <a:p>
             <a:r>
               <a:rPr lang="en-US" dirty="0"/>
@@ -19637,12 +19651,14 @@
         </p:nvSpPr>
         <p:spPr/>
         <p:txBody>
-          <a:bodyPr/>
+          <a:bodyPr>
+            <a:normAutofit/>
+          </a:bodyPr>
           <a:lstStyle/>
           <a:p>
             <a:r>
               <a:rPr lang="en-US" dirty="0"/>
-              <a:t>The Importance of Ethics</a:t>
+              <a:t>Requirements Analysis works best when human values are considered</a:t>
             </a:r>
           </a:p>
         </p:txBody>
@@ -19833,13 +19849,13 @@
         </p:nvSpPr>
         <p:spPr>
           <a:xfrm>
-            <a:off x="838200" y="1500160"/>
-            <a:ext cx="8648700" cy="4351338"/>
+            <a:off x="838200" y="1500159"/>
+            <a:ext cx="9465860" cy="4856191"/>
           </a:xfrm>
         </p:spPr>
         <p:txBody>
           <a:bodyPr>
-            <a:normAutofit fontScale="92500" lnSpcReduction="20000"/>
+            <a:normAutofit lnSpcReduction="10000"/>
           </a:bodyPr>
           <a:lstStyle/>
           <a:p>
@@ -21185,7 +21201,7 @@
           <a:p>
             <a:r>
               <a:rPr lang="en-US" dirty="0"/>
-              <a:t>The Reddit Case Study</a:t>
+              <a:t>Example: The Reddit Case Study</a:t>
             </a:r>
           </a:p>
         </p:txBody>

</xml_diff>

<commit_message>
addressed recent review comments
</commit_message>
<xml_diff>
--- a/Slides/Module 01.2 Requirements Gathering.pptx
+++ b/Slides/Module 01.2 Requirements Gathering.pptx
@@ -2319,8 +2319,8 @@
     <dgm:cxn modelId="{0D619939-DF3D-4D20-BB53-412AF78EA558}" type="presOf" srcId="{ABB0E679-4682-422A-B4B3-34D44CC4C90C}" destId="{BBEC7333-A5CB-4B43-A34A-870E516E4DD6}" srcOrd="0" destOrd="0" presId="urn:microsoft.com/office/officeart/2018/2/layout/IconVerticalSolidList"/>
     <dgm:cxn modelId="{07AC9C4A-377E-4379-B550-8DB49E3862F9}" srcId="{ABB0E679-4682-422A-B4B3-34D44CC4C90C}" destId="{8859CDF6-BBF5-4A76-8A76-407071531CB6}" srcOrd="2" destOrd="0" parTransId="{4553293F-765F-468C-A52D-17712ED16F1F}" sibTransId="{CD3D3010-EDC9-481C-A822-9AFA251D0BAD}"/>
     <dgm:cxn modelId="{F7C5F74B-BB11-4F28-9F7E-23FE778011DC}" type="presOf" srcId="{79B77230-D940-49CC-AF47-BF1D40797D89}" destId="{D527155E-0657-496B-926B-6BBC0B628D07}" srcOrd="0" destOrd="0" presId="urn:microsoft.com/office/officeart/2018/2/layout/IconVerticalSolidList"/>
+    <dgm:cxn modelId="{16B49D51-0857-4A44-AD1A-0C1006418460}" srcId="{7851135E-E593-49EB-9C66-FB8F80DCC8EB}" destId="{0F25331F-8FB8-4E3A-87F2-3F285D74EB32}" srcOrd="2" destOrd="0" parTransId="{324E124D-8500-4C04-A0BA-6F6C2D553D81}" sibTransId="{4716CEE8-C882-4DFA-8AAE-CB3797F9F69F}"/>
     <dgm:cxn modelId="{BBA2886E-1FC2-4FFE-BF42-BABB70DB9D54}" srcId="{ABB0E679-4682-422A-B4B3-34D44CC4C90C}" destId="{79B77230-D940-49CC-AF47-BF1D40797D89}" srcOrd="0" destOrd="0" parTransId="{C50558CC-69DA-4C28-8CB9-2982E9088524}" sibTransId="{01A261DD-4242-4987-8459-53BA826F65E4}"/>
-    <dgm:cxn modelId="{16B49D51-0857-4A44-AD1A-0C1006418460}" srcId="{7851135E-E593-49EB-9C66-FB8F80DCC8EB}" destId="{0F25331F-8FB8-4E3A-87F2-3F285D74EB32}" srcOrd="2" destOrd="0" parTransId="{324E124D-8500-4C04-A0BA-6F6C2D553D81}" sibTransId="{4716CEE8-C882-4DFA-8AAE-CB3797F9F69F}"/>
     <dgm:cxn modelId="{6F534F79-49C3-49F2-B767-CA8451407698}" type="presOf" srcId="{2CC7D121-8A41-44D9-89BD-244AA28A42A0}" destId="{D527155E-0657-496B-926B-6BBC0B628D07}" srcOrd="0" destOrd="1" presId="urn:microsoft.com/office/officeart/2018/2/layout/IconVerticalSolidList"/>
     <dgm:cxn modelId="{83B9F09E-EAE2-4CC8-ADD5-C1D9758C0071}" type="presOf" srcId="{A898EC3E-4F02-462D-8397-BC48F29AE81B}" destId="{4FB2F518-2BF4-4FD7-A56E-47F3A3918E17}" srcOrd="0" destOrd="0" presId="urn:microsoft.com/office/officeart/2018/2/layout/IconVerticalSolidList"/>
     <dgm:cxn modelId="{D9C411B4-474A-4FB0-9E9B-1E92A378E566}" srcId="{289B9B18-ED8C-4F8C-B57D-E359AFC29DCD}" destId="{A898EC3E-4F02-462D-8397-BC48F29AE81B}" srcOrd="0" destOrd="0" parTransId="{AD9DCD49-7708-4181-B664-3E4D3C91E37D}" sibTransId="{5F251CD8-B93E-4310-9598-EB0F0D698564}"/>
@@ -6135,7 +6135,7 @@
           <a:p>
             <a:fld id="{7C7E5181-6CF5-45F7-A87A-E0E0B1FD7549}" type="datetimeFigureOut">
               <a:rPr lang="en-US" smtClean="0"/>
-              <a:t>7/2/2025</a:t>
+              <a:t>7/7/25</a:t>
             </a:fld>
             <a:endParaRPr lang="en-US"/>
           </a:p>
@@ -8330,7 +8330,16 @@
           <a:p>
             <a:r>
               <a:rPr lang="en-US" dirty="0"/>
-              <a:t>It is essential to consider ethics and values when building technology. </a:t>
+              <a:t>It is essential to consider ethics and values when building technology. Ethics is a branch in Philosophy that explores the moral principles and values that guide human behavior and decision making. </a:t>
+            </a:r>
+          </a:p>
+          <a:p>
+            <a:endParaRPr lang="en-US" dirty="0"/>
+          </a:p>
+          <a:p>
+            <a:r>
+              <a:rPr lang="en-US" dirty="0"/>
+              <a:t>There is a growing consensus in CS disciplines such as HCI and software engineering to borrow concepts from ethics to help drive design and implementation of software systems.</a:t>
             </a:r>
           </a:p>
           <a:p>
@@ -8435,6 +8444,15 @@
           <a:p>
             <a:r>
               <a:rPr lang="en-US" dirty="0"/>
+              <a:t>We are going to understand the value of informed consent as a motivation to consider values in the requirements phase.</a:t>
+            </a:r>
+          </a:p>
+          <a:p>
+            <a:endParaRPr lang="en-US" dirty="0"/>
+          </a:p>
+          <a:p>
+            <a:r>
+              <a:rPr lang="en-US" dirty="0"/>
               <a:t>Cookies and security solutions such as HTTPS are an outcome of an analysis that considers ethical aspects and values such as informed consent</a:t>
             </a:r>
           </a:p>
@@ -8590,7 +8608,16 @@
           <a:p>
             <a:r>
               <a:rPr lang="en-US" dirty="0"/>
-              <a:t>The case study aligns with the final project</a:t>
+              <a:t>The Reddit case study will be used to illustrate the different types of investigations involved in the VSD framework.</a:t>
+            </a:r>
+          </a:p>
+          <a:p>
+            <a:endParaRPr lang="en-US" dirty="0"/>
+          </a:p>
+          <a:p>
+            <a:r>
+              <a:rPr lang="en-US" dirty="0"/>
+              <a:t>Like Stack Overflow, Reddit is a platform for discussion. Our hope is that using VSD here will help students align VSD with their final project on Stack Overflow.</a:t>
             </a:r>
           </a:p>
         </p:txBody>
@@ -8791,6 +8818,15 @@
           <a:p>
             <a:r>
               <a:rPr lang="en-US" dirty="0"/>
+              <a:t>Stakeholder analysis is part of value investigations</a:t>
+            </a:r>
+          </a:p>
+          <a:p>
+            <a:endParaRPr lang="en-US" dirty="0"/>
+          </a:p>
+          <a:p>
+            <a:r>
+              <a:rPr lang="en-US" dirty="0"/>
               <a:t>Students should reflect about these questions in groups.</a:t>
             </a:r>
           </a:p>
@@ -8979,16 +9015,13 @@
             </a:pPr>
             <a:r>
               <a:rPr lang="en-US" dirty="0"/>
-              <a:t>Impinges on users’ right to freely express and also prevents other users from being exposed to different </a:t>
-            </a:r>
-            <a:r>
-              <a:rPr lang="en-US" dirty="0" err="1"/>
-              <a:t>prespectives</a:t>
-            </a:r>
-            <a:r>
-              <a:rPr lang="en-US" dirty="0"/>
-              <a:t>.</a:t>
-            </a:r>
+              <a:t>Impinges on users’ right to freely express and also prevents other users from being exposed to </a:t>
+            </a:r>
+            <a:r>
+              <a:rPr lang="en-US"/>
+              <a:t>different perspectives.</a:t>
+            </a:r>
+            <a:endParaRPr lang="en-US" dirty="0"/>
           </a:p>
           <a:p>
             <a:pPr marL="228600" indent="-228600">
@@ -9194,6 +9227,12 @@
               <a:t>The students should pick a requirement based on their analysis. There is no correct answer as long as students are able to defend their choice.</a:t>
             </a:r>
           </a:p>
+          <a:p>
+            <a:endParaRPr lang="en-US" dirty="0"/>
+          </a:p>
+          <a:p>
+            <a:endParaRPr lang="en-US" i="1" dirty="0"/>
+          </a:p>
         </p:txBody>
       </p:sp>
       <p:sp>
@@ -9280,6 +9319,87 @@
               <a:rPr lang="en-US" dirty="0"/>
               <a:t>This is an after-class activity.</a:t>
             </a:r>
+          </a:p>
+          <a:p>
+            <a:endParaRPr lang="en-US" dirty="0"/>
+          </a:p>
+          <a:p>
+            <a:r>
+              <a:rPr lang="en-US" dirty="0"/>
+              <a:t>A sample user story based on the first requirement in the previous slide:</a:t>
+            </a:r>
+          </a:p>
+          <a:p>
+            <a:endParaRPr lang="en-US" dirty="0"/>
+          </a:p>
+          <a:p>
+            <a:r>
+              <a:rPr lang="en-US" i="1" dirty="0"/>
+              <a:t>As a </a:t>
+            </a:r>
+            <a:r>
+              <a:rPr lang="en-US" b="1" i="1" dirty="0"/>
+              <a:t>content creator </a:t>
+            </a:r>
+            <a:r>
+              <a:rPr lang="en-US" i="1" dirty="0"/>
+              <a:t>I want to express my opinions without offending any person so that I can contribute to a discussion in a constructive way</a:t>
+            </a:r>
+          </a:p>
+          <a:p>
+            <a:endParaRPr lang="en-US" i="1" dirty="0"/>
+          </a:p>
+          <a:p>
+            <a:r>
+              <a:rPr lang="en-US" i="1" dirty="0"/>
+              <a:t>Conditions of satisfaction:</a:t>
+            </a:r>
+          </a:p>
+          <a:p>
+            <a:endParaRPr lang="en-US" i="1" dirty="0"/>
+          </a:p>
+          <a:p>
+            <a:r>
+              <a:rPr lang="en-US" i="1" dirty="0"/>
+              <a:t>(E) I should be able to view my post in the forum if the post was not flagged</a:t>
+            </a:r>
+          </a:p>
+          <a:p>
+            <a:r>
+              <a:rPr lang="en-US" i="1" dirty="0"/>
+              <a:t>(E) I should be able to see a content warning with a reason for the warning if my post was flagged</a:t>
+            </a:r>
+          </a:p>
+          <a:p>
+            <a:r>
+              <a:rPr lang="en-US" i="1" dirty="0"/>
+              <a:t>(E) I should not be able to post if it was flagged</a:t>
+            </a:r>
+          </a:p>
+          <a:p>
+            <a:r>
+              <a:rPr lang="en-US" i="1" dirty="0"/>
+              <a:t>(E) I should be able to raise an appeal if my post was flagged</a:t>
+            </a:r>
+          </a:p>
+          <a:p>
+            <a:r>
+              <a:rPr lang="en-US" i="1" dirty="0"/>
+              <a:t>(D) I should receive a notification if my post was posted after review of flagged post</a:t>
+            </a:r>
+          </a:p>
+          <a:p>
+            <a:r>
+              <a:rPr lang="en-US" i="1" dirty="0"/>
+              <a:t>(E) I should be able to see a history of my flagged posts to help me better understand the forum’s policy on improper speech</a:t>
+            </a:r>
+          </a:p>
+          <a:p>
+            <a:r>
+              <a:rPr lang="en-US" i="1" dirty="0"/>
+              <a:t>(Ex) I should be able to see which official policy rule was violated if my post is flagged</a:t>
+            </a:r>
+            <a:endParaRPr lang="en-US" dirty="0"/>
           </a:p>
         </p:txBody>
       </p:sp>
@@ -10381,7 +10501,7 @@
           <a:p>
             <a:fld id="{5D2A64DE-480B-420F-9649-4F8E696E08E0}" type="datetime1">
               <a:rPr lang="en-US" smtClean="0"/>
-              <a:t>7/2/2025</a:t>
+              <a:t>7/7/25</a:t>
             </a:fld>
             <a:endParaRPr lang="en-US"/>
           </a:p>
@@ -10705,7 +10825,7 @@
           <a:p>
             <a:fld id="{EA476A42-A091-4468-A075-64A31BE59948}" type="datetime1">
               <a:rPr lang="en-US" smtClean="0"/>
-              <a:t>7/2/2025</a:t>
+              <a:t>7/7/25</a:t>
             </a:fld>
             <a:endParaRPr lang="en-US"/>
           </a:p>
@@ -10903,7 +11023,7 @@
           <a:p>
             <a:fld id="{0D3616D0-8311-4107-9726-6B805E7D05BA}" type="datetime1">
               <a:rPr lang="en-US" smtClean="0"/>
-              <a:t>7/2/2025</a:t>
+              <a:t>7/7/25</a:t>
             </a:fld>
             <a:endParaRPr lang="en-US"/>
           </a:p>
@@ -11111,7 +11231,7 @@
           <a:p>
             <a:fld id="{3BC2557A-5C88-417A-A763-5AC779462A5F}" type="datetime1">
               <a:rPr lang="en-US" smtClean="0"/>
-              <a:t>7/2/2025</a:t>
+              <a:t>7/7/25</a:t>
             </a:fld>
             <a:endParaRPr lang="en-US"/>
           </a:p>
@@ -11635,7 +11755,7 @@
           <a:p>
             <a:fld id="{07C7BFD4-467E-4EDE-93EA-052F5B39A4E5}" type="datetime1">
               <a:rPr lang="en-US" smtClean="0"/>
-              <a:t>7/2/2025</a:t>
+              <a:t>7/7/25</a:t>
             </a:fld>
             <a:endParaRPr lang="en-US"/>
           </a:p>
@@ -11885,7 +12005,7 @@
           <a:p>
             <a:fld id="{07C7BFD4-467E-4EDE-93EA-052F5B39A4E5}" type="datetime1">
               <a:rPr lang="en-US" smtClean="0"/>
-              <a:t>7/2/2025</a:t>
+              <a:t>7/7/25</a:t>
             </a:fld>
             <a:endParaRPr lang="en-US"/>
           </a:p>
@@ -12067,7 +12187,7 @@
           <a:p>
             <a:fld id="{109E55A0-C911-4F03-82FC-7E5926047D46}" type="datetime1">
               <a:rPr lang="en-US" smtClean="0"/>
-              <a:t>7/2/2025</a:t>
+              <a:t>7/7/25</a:t>
             </a:fld>
             <a:endParaRPr lang="en-US"/>
           </a:p>
@@ -12380,7 +12500,7 @@
           <a:p>
             <a:fld id="{A533CBE2-D5BE-47AC-ADC2-9CDFC1D0CF90}" type="datetime1">
               <a:rPr lang="en-US" smtClean="0"/>
-              <a:t>7/2/2025</a:t>
+              <a:t>7/7/25</a:t>
             </a:fld>
             <a:endParaRPr lang="en-US"/>
           </a:p>
@@ -12681,7 +12801,7 @@
           <a:p>
             <a:fld id="{39B7EDB1-CE74-4951-85A2-0B01C2128E28}" type="datetime1">
               <a:rPr lang="en-US" smtClean="0"/>
-              <a:t>7/2/2025</a:t>
+              <a:t>7/7/25</a:t>
             </a:fld>
             <a:endParaRPr lang="en-US"/>
           </a:p>
@@ -13129,7 +13249,7 @@
           <a:p>
             <a:fld id="{2BC7EB92-A5C2-4807-A9DC-9EDE6CBFB241}" type="datetime1">
               <a:rPr lang="en-US" smtClean="0"/>
-              <a:t>7/2/2025</a:t>
+              <a:t>7/7/25</a:t>
             </a:fld>
             <a:endParaRPr lang="en-US"/>
           </a:p>
@@ -13242,7 +13362,7 @@
           <a:p>
             <a:fld id="{2B7B7EE0-7771-4CD5-9B2B-3550753A54A1}" type="datetime1">
               <a:rPr lang="en-US" smtClean="0"/>
-              <a:t>7/2/2025</a:t>
+              <a:t>7/7/25</a:t>
             </a:fld>
             <a:endParaRPr lang="en-US"/>
           </a:p>
@@ -13553,7 +13673,7 @@
           <a:p>
             <a:fld id="{F8B318B3-0E87-4416-A9B8-D891968C2727}" type="datetime1">
               <a:rPr lang="en-US" smtClean="0"/>
-              <a:t>7/2/2025</a:t>
+              <a:t>7/7/25</a:t>
             </a:fld>
             <a:endParaRPr lang="en-US"/>
           </a:p>
@@ -13794,7 +13914,7 @@
           <a:p>
             <a:fld id="{54D997E8-DDEE-43F1-8D9B-F8A1E11DE488}" type="datetime1">
               <a:rPr lang="en-US" smtClean="0"/>
-              <a:t>7/2/2025</a:t>
+              <a:t>7/7/25</a:t>
             </a:fld>
             <a:endParaRPr lang="en-US"/>
           </a:p>
@@ -19658,7 +19778,7 @@
           <a:p>
             <a:r>
               <a:rPr lang="en-US" dirty="0"/>
-              <a:t>Requirements Analysis works best when human values are considered</a:t>
+              <a:t>Value Sensitive Design – An Ethical Framework to write better User Stories</a:t>
             </a:r>
           </a:p>
         </p:txBody>
@@ -19826,7 +19946,7 @@
           <a:p>
             <a:r>
               <a:rPr lang="en-US" dirty="0"/>
-              <a:t>Informed Consent Online</a:t>
+              <a:t>Informed Consent – A Human Value Example</a:t>
             </a:r>
           </a:p>
         </p:txBody>
@@ -19855,47 +19975,41 @@
         </p:spPr>
         <p:txBody>
           <a:bodyPr>
-            <a:normAutofit lnSpcReduction="10000"/>
+            <a:normAutofit fontScale="92500" lnSpcReduction="20000"/>
           </a:bodyPr>
           <a:lstStyle/>
           <a:p>
             <a:r>
               <a:rPr lang="en-US" dirty="0"/>
-              <a:t>Information technologies collect vast amounts of information about users and their interactions.</a:t>
-            </a:r>
-          </a:p>
-          <a:p>
-            <a:r>
-              <a:rPr lang="en-US" dirty="0"/>
-              <a:t>Often users have no control over</a:t>
+              <a:t>Information technologies collect vast amounts of information about users, who have no control over </a:t>
             </a:r>
           </a:p>
           <a:p>
             <a:pPr lvl="1"/>
             <a:r>
               <a:rPr lang="en-US" dirty="0"/>
-              <a:t>What information is collected</a:t>
+              <a:t>What information is collected,</a:t>
             </a:r>
           </a:p>
           <a:p>
             <a:pPr lvl="1"/>
             <a:r>
               <a:rPr lang="en-US" dirty="0"/>
-              <a:t>Who will have access</a:t>
+              <a:t>Who will have access,</a:t>
             </a:r>
           </a:p>
           <a:p>
             <a:pPr lvl="1"/>
             <a:r>
               <a:rPr lang="en-US" dirty="0"/>
-              <a:t>How long will it be archived</a:t>
+              <a:t>How long will it be archived,</a:t>
             </a:r>
           </a:p>
           <a:p>
             <a:pPr lvl="1"/>
             <a:r>
               <a:rPr lang="en-US" dirty="0"/>
-              <a:t>What will it be used for</a:t>
+              <a:t>What will it be used for,</a:t>
             </a:r>
           </a:p>
           <a:p>
@@ -19906,13 +20020,23 @@
             </a:r>
           </a:p>
           <a:p>
+            <a:r>
+              <a:rPr lang="en-US" dirty="0"/>
+              <a:t>Such technologies are an outcome of not considering values such as </a:t>
+            </a:r>
             <a:r>
               <a:rPr lang="en-US" b="1" dirty="0"/>
               <a:t>Informed consent</a:t>
             </a:r>
             <a:r>
               <a:rPr lang="en-US" dirty="0"/>
-              <a:t> is one way to modulate the impact of this data collection.</a:t>
+              <a:t> during the requirements analysis phase. </a:t>
+            </a:r>
+          </a:p>
+          <a:p>
+            <a:r>
+              <a:rPr lang="en-US" dirty="0"/>
+              <a:t>To consider informed consent we need to understand what it means generally and in the specific context of information technologies. What do you think it means?</a:t>
             </a:r>
           </a:p>
           <a:p>
@@ -21711,7 +21835,7 @@
           <a:p>
             <a:r>
               <a:rPr lang="en-US" dirty="0"/>
-              <a:t>Stakeholder Analysis</a:t>
+              <a:t>Value Investigation – Who are the Stakeholders?</a:t>
             </a:r>
           </a:p>
         </p:txBody>
@@ -21867,7 +21991,7 @@
           <a:p>
             <a:r>
               <a:rPr lang="en-US" dirty="0"/>
-              <a:t>Value Investigations</a:t>
+              <a:t>Value Investigation – What are the value tensions?</a:t>
             </a:r>
           </a:p>
         </p:txBody>
@@ -22296,12 +22420,14 @@
         </p:nvSpPr>
         <p:spPr/>
         <p:txBody>
-          <a:bodyPr/>
+          <a:bodyPr>
+            <a:normAutofit lnSpcReduction="10000"/>
+          </a:bodyPr>
           <a:lstStyle/>
           <a:p>
             <a:r>
               <a:rPr lang="en-US" dirty="0"/>
-              <a:t>Suppose as a result of the VSD analysis we came up with two high-level requirements:</a:t>
+              <a:t>Suppose as a result of the value investigations we came up with two high-level requirements:</a:t>
             </a:r>
           </a:p>
           <a:p>
@@ -22327,7 +22453,15 @@
           <a:p>
             <a:r>
               <a:rPr lang="en-US" dirty="0"/>
-              <a:t>Which requirement would you prefer and why in terms of the values you think are important to you?</a:t>
+              <a:t>Which requirement would you prefer based on the </a:t>
+            </a:r>
+            <a:r>
+              <a:rPr lang="en-US" i="1" dirty="0"/>
+              <a:t>technical feasibility and the values</a:t>
+            </a:r>
+            <a:r>
+              <a:rPr lang="en-US" dirty="0"/>
+              <a:t> that you think are important?</a:t>
             </a:r>
           </a:p>
         </p:txBody>
@@ -22414,7 +22548,7 @@
           <a:p>
             <a:r>
               <a:rPr lang="en-US" dirty="0"/>
-              <a:t>VSD and User Stories</a:t>
+              <a:t>Using VSD to Define User Stories</a:t>
             </a:r>
           </a:p>
         </p:txBody>
@@ -22477,6 +22611,12 @@
             <a:r>
               <a:rPr lang="en-US" dirty="0"/>
               <a:t>What are the conditions of satisfaction?</a:t>
+            </a:r>
+          </a:p>
+          <a:p>
+            <a:r>
+              <a:rPr lang="en-US" dirty="0"/>
+              <a:t>Download the detailed instructions of the activity from the course website (add link).</a:t>
             </a:r>
           </a:p>
         </p:txBody>
@@ -22631,7 +22771,7 @@
             <a:pPr lvl="1"/>
             <a:r>
               <a:rPr lang="en-US" dirty="0"/>
-              <a:t>Use Value Sensitive Design to uncover requirements based on stakeholder analysis and value investigations.</a:t>
+              <a:t>Use Value Sensitive Design to uncover requirements based on the different kinds of investigations.</a:t>
             </a:r>
           </a:p>
         </p:txBody>

</xml_diff>

<commit_message>
small tweaks to M01.1 and M01.2. Pdfs NOT updated
</commit_message>
<xml_diff>
--- a/Slides/Module 01.2 Requirements Gathering.pptx
+++ b/Slides/Module 01.2 Requirements Gathering.pptx
@@ -17983,7 +17983,7 @@
         <p:spPr/>
         <p:txBody>
           <a:bodyPr>
-            <a:normAutofit lnSpcReduction="10000"/>
+            <a:normAutofit fontScale="92500"/>
           </a:bodyPr>
           <a:lstStyle/>
           <a:p>
@@ -18009,8 +18009,13 @@
             </a:pPr>
             <a:r>
               <a:rPr lang="en-US" dirty="0"/>
-              <a:t>The system prompts the user to reconsider (does not prevent) if their post is potentially offensive.</a:t>
-            </a:r>
+              <a:t>The system prompts the user to reconsider if their post is potentially offensive, but does not prevent it </a:t>
+            </a:r>
+            <a:r>
+              <a:rPr lang="en-US"/>
+              <a:t>from being posted.</a:t>
+            </a:r>
+            <a:endParaRPr lang="en-US" dirty="0"/>
           </a:p>
           <a:p>
             <a:r>

</xml_diff>

<commit_message>
creating pdf for m1,2
</commit_message>
<xml_diff>
--- a/Slides/Module 01.2 Requirements Gathering.pptx
+++ b/Slides/Module 01.2 Requirements Gathering.pptx
@@ -15722,6 +15722,16 @@
           <a:p>
             <a:r>
               <a:rPr lang="en-US" dirty="0"/>
+              <a:t>Another Example:</a:t>
+            </a:r>
+            <a:br>
+              <a:rPr lang="en-US" dirty="0"/>
+            </a:br>
+            <a:br>
+              <a:rPr lang="en-US" dirty="0"/>
+            </a:br>
+            <a:r>
+              <a:rPr lang="en-US" dirty="0"/>
               <a:t>User Story</a:t>
             </a:r>
           </a:p>
@@ -17370,7 +17380,7 @@
             <a:pPr lvl="1"/>
             <a:r>
               <a:rPr lang="en-US" dirty="0"/>
-              <a:t>specify how the system should behave</a:t>
+              <a:t>specify how the system should behave (those are the ones we have seen so far, written as user stories)</a:t>
             </a:r>
           </a:p>
           <a:p>

</xml_diff>

<commit_message>
hid the slide that says hidden
</commit_message>
<xml_diff>
--- a/Slides/Module 01.2 Requirements Gathering.pptx
+++ b/Slides/Module 01.2 Requirements Gathering.pptx
@@ -32,11 +32,11 @@
     <p:sldId id="494" r:id="rId23"/>
     <p:sldId id="572" r:id="rId24"/>
     <p:sldId id="566" r:id="rId25"/>
-    <p:sldId id="567" r:id="rId26"/>
-    <p:sldId id="570" r:id="rId27"/>
-    <p:sldId id="571" r:id="rId28"/>
-    <p:sldId id="528" r:id="rId29"/>
-    <p:sldId id="573" r:id="rId30"/>
+    <p:sldId id="573" r:id="rId26"/>
+    <p:sldId id="567" r:id="rId27"/>
+    <p:sldId id="570" r:id="rId28"/>
+    <p:sldId id="571" r:id="rId29"/>
+    <p:sldId id="528" r:id="rId30"/>
     <p:sldId id="563" r:id="rId31"/>
     <p:sldId id="555" r:id="rId32"/>
     <p:sldId id="556" r:id="rId33"/>
@@ -189,11 +189,11 @@
             <p14:sldId id="494"/>
             <p14:sldId id="572"/>
             <p14:sldId id="566"/>
+            <p14:sldId id="573"/>
             <p14:sldId id="567"/>
             <p14:sldId id="570"/>
             <p14:sldId id="571"/>
             <p14:sldId id="528"/>
-            <p14:sldId id="573"/>
             <p14:sldId id="563"/>
             <p14:sldId id="555"/>
             <p14:sldId id="556"/>
@@ -8023,7 +8023,7 @@
           <a:p>
             <a:fld id="{07937F07-1250-4CCE-B198-1B2887014F41}" type="slidenum">
               <a:rPr lang="en-US" smtClean="0"/>
-              <a:t>25</a:t>
+              <a:t>26</a:t>
             </a:fld>
             <a:endParaRPr lang="en-US"/>
           </a:p>
@@ -8134,7 +8134,7 @@
           <a:p>
             <a:fld id="{07937F07-1250-4CCE-B198-1B2887014F41}" type="slidenum">
               <a:rPr lang="en-US" smtClean="0"/>
-              <a:t>26</a:t>
+              <a:t>27</a:t>
             </a:fld>
             <a:endParaRPr lang="en-US"/>
           </a:p>
@@ -8245,7 +8245,7 @@
           <a:p>
             <a:fld id="{07937F07-1250-4CCE-B198-1B2887014F41}" type="slidenum">
               <a:rPr lang="en-US" smtClean="0"/>
-              <a:t>27</a:t>
+              <a:t>28</a:t>
             </a:fld>
             <a:endParaRPr lang="en-US"/>
           </a:p>
@@ -8329,7 +8329,7 @@
           <a:p>
             <a:fld id="{07937F07-1250-4CCE-B198-1B2887014F41}" type="slidenum">
               <a:rPr lang="en-US" smtClean="0"/>
-              <a:t>28</a:t>
+              <a:t>29</a:t>
             </a:fld>
             <a:endParaRPr lang="en-US"/>
           </a:p>
@@ -18425,6 +18425,118 @@
   <p:cSld>
     <p:spTree>
       <p:nvGrpSpPr>
+        <p:cNvPr id="1" name=""/>
+        <p:cNvGrpSpPr/>
+        <p:nvPr/>
+      </p:nvGrpSpPr>
+      <p:grpSpPr>
+        <a:xfrm>
+          <a:off x="0" y="0"/>
+          <a:ext cx="0" cy="0"/>
+          <a:chOff x="0" y="0"/>
+          <a:chExt cx="0" cy="0"/>
+        </a:xfrm>
+      </p:grpSpPr>
+      <p:sp>
+        <p:nvSpPr>
+          <p:cNvPr id="2" name="Title 1">
+            <a:extLst>
+              <a:ext uri="{FF2B5EF4-FFF2-40B4-BE49-F238E27FC236}">
+                <a16:creationId xmlns:a16="http://schemas.microsoft.com/office/drawing/2014/main" id="{E1A75E89-1D90-7489-00D4-B96439527CA8}"/>
+              </a:ext>
+            </a:extLst>
+          </p:cNvPr>
+          <p:cNvSpPr>
+            <a:spLocks noGrp="1"/>
+          </p:cNvSpPr>
+          <p:nvPr>
+            <p:ph type="title"/>
+          </p:nvPr>
+        </p:nvSpPr>
+        <p:spPr/>
+        <p:txBody>
+          <a:bodyPr/>
+          <a:lstStyle/>
+          <a:p>
+            <a:r>
+              <a:rPr lang="en-US" dirty="0"/>
+              <a:t>EVERYTHING PAST HERE IS CURRENTLY HIDDEN</a:t>
+            </a:r>
+          </a:p>
+        </p:txBody>
+      </p:sp>
+      <p:sp>
+        <p:nvSpPr>
+          <p:cNvPr id="3" name="Content Placeholder 2">
+            <a:extLst>
+              <a:ext uri="{FF2B5EF4-FFF2-40B4-BE49-F238E27FC236}">
+                <a16:creationId xmlns:a16="http://schemas.microsoft.com/office/drawing/2014/main" id="{CF8F3E74-7EE8-585C-5F0C-4FA1E00F251F}"/>
+              </a:ext>
+            </a:extLst>
+          </p:cNvPr>
+          <p:cNvSpPr>
+            <a:spLocks noGrp="1"/>
+          </p:cNvSpPr>
+          <p:nvPr>
+            <p:ph idx="1"/>
+          </p:nvPr>
+        </p:nvSpPr>
+        <p:spPr/>
+        <p:txBody>
+          <a:bodyPr/>
+          <a:lstStyle/>
+          <a:p>
+            <a:endParaRPr lang="en-US"/>
+          </a:p>
+        </p:txBody>
+      </p:sp>
+      <p:sp>
+        <p:nvSpPr>
+          <p:cNvPr id="4" name="Slide Number Placeholder 3">
+            <a:extLst>
+              <a:ext uri="{FF2B5EF4-FFF2-40B4-BE49-F238E27FC236}">
+                <a16:creationId xmlns:a16="http://schemas.microsoft.com/office/drawing/2014/main" id="{F27AB2EB-5678-83DB-3A9F-B9149F3D3495}"/>
+              </a:ext>
+            </a:extLst>
+          </p:cNvPr>
+          <p:cNvSpPr>
+            <a:spLocks noGrp="1"/>
+          </p:cNvSpPr>
+          <p:nvPr>
+            <p:ph type="sldNum" sz="quarter" idx="12"/>
+          </p:nvPr>
+        </p:nvSpPr>
+        <p:spPr/>
+        <p:txBody>
+          <a:bodyPr/>
+          <a:lstStyle/>
+          <a:p>
+            <a:fld id="{20F37917-FD3A-4669-9018-DA04BCDD3D75}" type="slidenum">
+              <a:rPr lang="en-US" smtClean="0"/>
+              <a:t>25</a:t>
+            </a:fld>
+            <a:endParaRPr lang="en-US"/>
+          </a:p>
+        </p:txBody>
+      </p:sp>
+    </p:spTree>
+    <p:extLst>
+      <p:ext uri="{BB962C8B-B14F-4D97-AF65-F5344CB8AC3E}">
+        <p14:creationId xmlns:p14="http://schemas.microsoft.com/office/powerpoint/2010/main" val="3013415274"/>
+      </p:ext>
+    </p:extLst>
+  </p:cSld>
+  <p:clrMapOvr>
+    <a:masterClrMapping/>
+  </p:clrMapOvr>
+</p:sld>
+</file>
+
+<file path=ppt/slides/slide26.xml><?xml version="1.0" encoding="utf-8"?>
+<p:sld xmlns:a="http://schemas.openxmlformats.org/drawingml/2006/main" xmlns:r="http://schemas.openxmlformats.org/officeDocument/2006/relationships" xmlns:p="http://schemas.openxmlformats.org/presentationml/2006/main" show="0">
+  <p:cSld>
+    <p:spTree>
+      <p:nvGrpSpPr>
         <p:cNvPr id="1" name="">
           <a:extLst>
             <a:ext uri="{FF2B5EF4-FFF2-40B4-BE49-F238E27FC236}">
@@ -18578,7 +18690,7 @@
           <a:p>
             <a:fld id="{20F37917-FD3A-4669-9018-DA04BCDD3D75}" type="slidenum">
               <a:rPr lang="en-US" smtClean="0"/>
-              <a:t>25</a:t>
+              <a:t>26</a:t>
             </a:fld>
             <a:endParaRPr lang="en-US"/>
           </a:p>
@@ -18597,7 +18709,7 @@
 </p:sld>
 </file>
 
-<file path=ppt/slides/slide26.xml><?xml version="1.0" encoding="utf-8"?>
+<file path=ppt/slides/slide27.xml><?xml version="1.0" encoding="utf-8"?>
 <p:sld xmlns:a="http://schemas.openxmlformats.org/drawingml/2006/main" xmlns:r="http://schemas.openxmlformats.org/officeDocument/2006/relationships" xmlns:p="http://schemas.openxmlformats.org/presentationml/2006/main" show="0">
   <p:cSld>
     <p:spTree>
@@ -18673,7 +18785,7 @@
           <a:p>
             <a:fld id="{20F37917-FD3A-4669-9018-DA04BCDD3D75}" type="slidenum">
               <a:rPr lang="en-US" smtClean="0"/>
-              <a:t>26</a:t>
+              <a:t>27</a:t>
             </a:fld>
             <a:endParaRPr lang="en-US"/>
           </a:p>
@@ -19194,7 +19306,7 @@
 </p:sld>
 </file>
 
-<file path=ppt/slides/slide27.xml><?xml version="1.0" encoding="utf-8"?>
+<file path=ppt/slides/slide28.xml><?xml version="1.0" encoding="utf-8"?>
 <p:sld xmlns:a="http://schemas.openxmlformats.org/drawingml/2006/main" xmlns:r="http://schemas.openxmlformats.org/officeDocument/2006/relationships" xmlns:p="http://schemas.openxmlformats.org/presentationml/2006/main" show="0">
   <p:cSld>
     <p:spTree>
@@ -19270,7 +19382,7 @@
           <a:p>
             <a:fld id="{20F37917-FD3A-4669-9018-DA04BCDD3D75}" type="slidenum">
               <a:rPr lang="en-US" smtClean="0"/>
-              <a:t>27</a:t>
+              <a:t>28</a:t>
             </a:fld>
             <a:endParaRPr lang="en-US"/>
           </a:p>
@@ -19833,7 +19945,7 @@
 </p:sld>
 </file>
 
-<file path=ppt/slides/slide28.xml><?xml version="1.0" encoding="utf-8"?>
+<file path=ppt/slides/slide29.xml><?xml version="1.0" encoding="utf-8"?>
 <p:sld xmlns:a="http://schemas.openxmlformats.org/drawingml/2006/main" xmlns:r="http://schemas.openxmlformats.org/officeDocument/2006/relationships" xmlns:p="http://schemas.openxmlformats.org/presentationml/2006/main" show="0">
   <p:cSld>
     <p:bg>
@@ -20515,7 +20627,7 @@
                   <a:spcPts val="600"/>
                 </a:spcAft>
               </a:pPr>
-              <a:t>28</a:t>
+              <a:t>29</a:t>
             </a:fld>
             <a:endParaRPr lang="en-US"/>
           </a:p>
@@ -20525,118 +20637,6 @@
     <p:extLst>
       <p:ext uri="{BB962C8B-B14F-4D97-AF65-F5344CB8AC3E}">
         <p14:creationId xmlns:p14="http://schemas.microsoft.com/office/powerpoint/2010/main" val="1303431113"/>
-      </p:ext>
-    </p:extLst>
-  </p:cSld>
-  <p:clrMapOvr>
-    <a:masterClrMapping/>
-  </p:clrMapOvr>
-</p:sld>
-</file>
-
-<file path=ppt/slides/slide29.xml><?xml version="1.0" encoding="utf-8"?>
-<p:sld xmlns:a="http://schemas.openxmlformats.org/drawingml/2006/main" xmlns:r="http://schemas.openxmlformats.org/officeDocument/2006/relationships" xmlns:p="http://schemas.openxmlformats.org/presentationml/2006/main">
-  <p:cSld>
-    <p:spTree>
-      <p:nvGrpSpPr>
-        <p:cNvPr id="1" name=""/>
-        <p:cNvGrpSpPr/>
-        <p:nvPr/>
-      </p:nvGrpSpPr>
-      <p:grpSpPr>
-        <a:xfrm>
-          <a:off x="0" y="0"/>
-          <a:ext cx="0" cy="0"/>
-          <a:chOff x="0" y="0"/>
-          <a:chExt cx="0" cy="0"/>
-        </a:xfrm>
-      </p:grpSpPr>
-      <p:sp>
-        <p:nvSpPr>
-          <p:cNvPr id="2" name="Title 1">
-            <a:extLst>
-              <a:ext uri="{FF2B5EF4-FFF2-40B4-BE49-F238E27FC236}">
-                <a16:creationId xmlns:a16="http://schemas.microsoft.com/office/drawing/2014/main" id="{E1A75E89-1D90-7489-00D4-B96439527CA8}"/>
-              </a:ext>
-            </a:extLst>
-          </p:cNvPr>
-          <p:cNvSpPr>
-            <a:spLocks noGrp="1"/>
-          </p:cNvSpPr>
-          <p:nvPr>
-            <p:ph type="title"/>
-          </p:nvPr>
-        </p:nvSpPr>
-        <p:spPr/>
-        <p:txBody>
-          <a:bodyPr/>
-          <a:lstStyle/>
-          <a:p>
-            <a:r>
-              <a:rPr lang="en-US" dirty="0"/>
-              <a:t>EVERYTHING PAST HERE IS CURRENTLY HIDDEN</a:t>
-            </a:r>
-          </a:p>
-        </p:txBody>
-      </p:sp>
-      <p:sp>
-        <p:nvSpPr>
-          <p:cNvPr id="3" name="Content Placeholder 2">
-            <a:extLst>
-              <a:ext uri="{FF2B5EF4-FFF2-40B4-BE49-F238E27FC236}">
-                <a16:creationId xmlns:a16="http://schemas.microsoft.com/office/drawing/2014/main" id="{CF8F3E74-7EE8-585C-5F0C-4FA1E00F251F}"/>
-              </a:ext>
-            </a:extLst>
-          </p:cNvPr>
-          <p:cNvSpPr>
-            <a:spLocks noGrp="1"/>
-          </p:cNvSpPr>
-          <p:nvPr>
-            <p:ph idx="1"/>
-          </p:nvPr>
-        </p:nvSpPr>
-        <p:spPr/>
-        <p:txBody>
-          <a:bodyPr/>
-          <a:lstStyle/>
-          <a:p>
-            <a:endParaRPr lang="en-US"/>
-          </a:p>
-        </p:txBody>
-      </p:sp>
-      <p:sp>
-        <p:nvSpPr>
-          <p:cNvPr id="4" name="Slide Number Placeholder 3">
-            <a:extLst>
-              <a:ext uri="{FF2B5EF4-FFF2-40B4-BE49-F238E27FC236}">
-                <a16:creationId xmlns:a16="http://schemas.microsoft.com/office/drawing/2014/main" id="{F27AB2EB-5678-83DB-3A9F-B9149F3D3495}"/>
-              </a:ext>
-            </a:extLst>
-          </p:cNvPr>
-          <p:cNvSpPr>
-            <a:spLocks noGrp="1"/>
-          </p:cNvSpPr>
-          <p:nvPr>
-            <p:ph type="sldNum" sz="quarter" idx="12"/>
-          </p:nvPr>
-        </p:nvSpPr>
-        <p:spPr/>
-        <p:txBody>
-          <a:bodyPr/>
-          <a:lstStyle/>
-          <a:p>
-            <a:fld id="{20F37917-FD3A-4669-9018-DA04BCDD3D75}" type="slidenum">
-              <a:rPr lang="en-US" smtClean="0"/>
-              <a:t>29</a:t>
-            </a:fld>
-            <a:endParaRPr lang="en-US"/>
-          </a:p>
-        </p:txBody>
-      </p:sp>
-    </p:spTree>
-    <p:extLst>
-      <p:ext uri="{BB962C8B-B14F-4D97-AF65-F5344CB8AC3E}">
-        <p14:creationId xmlns:p14="http://schemas.microsoft.com/office/powerpoint/2010/main" val="3013415274"/>
       </p:ext>
     </p:extLst>
   </p:cSld>

</xml_diff>

<commit_message>
fix assorted typos in M01.1-M01.2
</commit_message>
<xml_diff>
--- a/Slides/Module 01.2 Requirements Gathering.pptx
+++ b/Slides/Module 01.2 Requirements Gathering.pptx
@@ -6109,7 +6109,7 @@
           <a:p>
             <a:fld id="{7C7E5181-6CF5-45F7-A87A-E0E0B1FD7549}" type="datetimeFigureOut">
               <a:rPr lang="en-US" smtClean="0"/>
-              <a:t>9/3/2025</a:t>
+              <a:t>9/4/2025</a:t>
             </a:fld>
             <a:endParaRPr lang="en-US"/>
           </a:p>
@@ -9520,7 +9520,7 @@
           <a:p>
             <a:fld id="{5D2A64DE-480B-420F-9649-4F8E696E08E0}" type="datetime1">
               <a:rPr lang="en-US" smtClean="0"/>
-              <a:t>9/3/2025</a:t>
+              <a:t>9/4/2025</a:t>
             </a:fld>
             <a:endParaRPr lang="en-US"/>
           </a:p>
@@ -9844,7 +9844,7 @@
           <a:p>
             <a:fld id="{EA476A42-A091-4468-A075-64A31BE59948}" type="datetime1">
               <a:rPr lang="en-US" smtClean="0"/>
-              <a:t>9/3/2025</a:t>
+              <a:t>9/4/2025</a:t>
             </a:fld>
             <a:endParaRPr lang="en-US"/>
           </a:p>
@@ -10042,7 +10042,7 @@
           <a:p>
             <a:fld id="{0D3616D0-8311-4107-9726-6B805E7D05BA}" type="datetime1">
               <a:rPr lang="en-US" smtClean="0"/>
-              <a:t>9/3/2025</a:t>
+              <a:t>9/4/2025</a:t>
             </a:fld>
             <a:endParaRPr lang="en-US"/>
           </a:p>
@@ -10250,7 +10250,7 @@
           <a:p>
             <a:fld id="{3BC2557A-5C88-417A-A763-5AC779462A5F}" type="datetime1">
               <a:rPr lang="en-US" smtClean="0"/>
-              <a:t>9/3/2025</a:t>
+              <a:t>9/4/2025</a:t>
             </a:fld>
             <a:endParaRPr lang="en-US"/>
           </a:p>
@@ -10774,7 +10774,7 @@
           <a:p>
             <a:fld id="{07C7BFD4-467E-4EDE-93EA-052F5B39A4E5}" type="datetime1">
               <a:rPr lang="en-US" smtClean="0"/>
-              <a:t>9/3/2025</a:t>
+              <a:t>9/4/2025</a:t>
             </a:fld>
             <a:endParaRPr lang="en-US"/>
           </a:p>
@@ -11024,7 +11024,7 @@
           <a:p>
             <a:fld id="{07C7BFD4-467E-4EDE-93EA-052F5B39A4E5}" type="datetime1">
               <a:rPr lang="en-US" smtClean="0"/>
-              <a:t>9/3/2025</a:t>
+              <a:t>9/4/2025</a:t>
             </a:fld>
             <a:endParaRPr lang="en-US"/>
           </a:p>
@@ -11206,7 +11206,7 @@
           <a:p>
             <a:fld id="{109E55A0-C911-4F03-82FC-7E5926047D46}" type="datetime1">
               <a:rPr lang="en-US" smtClean="0"/>
-              <a:t>9/3/2025</a:t>
+              <a:t>9/4/2025</a:t>
             </a:fld>
             <a:endParaRPr lang="en-US"/>
           </a:p>
@@ -11519,7 +11519,7 @@
           <a:p>
             <a:fld id="{A533CBE2-D5BE-47AC-ADC2-9CDFC1D0CF90}" type="datetime1">
               <a:rPr lang="en-US" smtClean="0"/>
-              <a:t>9/3/2025</a:t>
+              <a:t>9/4/2025</a:t>
             </a:fld>
             <a:endParaRPr lang="en-US"/>
           </a:p>
@@ -11820,7 +11820,7 @@
           <a:p>
             <a:fld id="{39B7EDB1-CE74-4951-85A2-0B01C2128E28}" type="datetime1">
               <a:rPr lang="en-US" smtClean="0"/>
-              <a:t>9/3/2025</a:t>
+              <a:t>9/4/2025</a:t>
             </a:fld>
             <a:endParaRPr lang="en-US"/>
           </a:p>
@@ -12268,7 +12268,7 @@
           <a:p>
             <a:fld id="{2BC7EB92-A5C2-4807-A9DC-9EDE6CBFB241}" type="datetime1">
               <a:rPr lang="en-US" smtClean="0"/>
-              <a:t>9/3/2025</a:t>
+              <a:t>9/4/2025</a:t>
             </a:fld>
             <a:endParaRPr lang="en-US"/>
           </a:p>
@@ -12381,7 +12381,7 @@
           <a:p>
             <a:fld id="{2B7B7EE0-7771-4CD5-9B2B-3550753A54A1}" type="datetime1">
               <a:rPr lang="en-US" smtClean="0"/>
-              <a:t>9/3/2025</a:t>
+              <a:t>9/4/2025</a:t>
             </a:fld>
             <a:endParaRPr lang="en-US"/>
           </a:p>
@@ -12692,7 +12692,7 @@
           <a:p>
             <a:fld id="{F8B318B3-0E87-4416-A9B8-D891968C2727}" type="datetime1">
               <a:rPr lang="en-US" smtClean="0"/>
-              <a:t>9/3/2025</a:t>
+              <a:t>9/4/2025</a:t>
             </a:fld>
             <a:endParaRPr lang="en-US"/>
           </a:p>
@@ -12933,7 +12933,7 @@
           <a:p>
             <a:fld id="{54D997E8-DDEE-43F1-8D9B-F8A1E11DE488}" type="datetime1">
               <a:rPr lang="en-US" smtClean="0"/>
-              <a:t>9/3/2025</a:t>
+              <a:t>9/4/2025</a:t>
             </a:fld>
             <a:endParaRPr lang="en-US"/>
           </a:p>
@@ -16235,7 +16235,7 @@
             <a:pPr lvl="1"/>
             <a:r>
               <a:rPr lang="en-US" dirty="0"/>
-              <a:t>Are these any times when I can’t use this system? (Availability) </a:t>
+              <a:t>Are there any times when I can’t use this system? (Availability) </a:t>
             </a:r>
           </a:p>
         </p:txBody>

</xml_diff>